<commit_message>
loop detection issue fixed. try to extend the rope on demand.
</commit_message>
<xml_diff>
--- a/readme.pptx
+++ b/readme.pptx
@@ -5,7 +5,7 @@
     <p:sldMasterId id="2147483648" r:id="rId1"/>
   </p:sldMasterIdLst>
   <p:notesMasterIdLst>
-    <p:notesMasterId r:id="rId10"/>
+    <p:notesMasterId r:id="rId11"/>
   </p:notesMasterIdLst>
   <p:sldIdLst>
     <p:sldId id="256" r:id="rId2"/>
@@ -16,6 +16,7 @@
     <p:sldId id="263" r:id="rId7"/>
     <p:sldId id="257" r:id="rId8"/>
     <p:sldId id="261" r:id="rId9"/>
+    <p:sldId id="267" r:id="rId10"/>
   </p:sldIdLst>
   <p:sldSz cx="12192000" cy="6858000"/>
   <p:notesSz cx="6858000" cy="9144000"/>
@@ -125,7 +126,7 @@
 <file path=ppt/revisionInfo.xml><?xml version="1.0" encoding="utf-8"?>
 <p1510:revInfo xmlns:a="http://schemas.openxmlformats.org/drawingml/2006/main" xmlns:r="http://schemas.openxmlformats.org/officeDocument/2006/relationships" xmlns:p1510="http://schemas.microsoft.com/office/powerpoint/2015/10/main">
   <p1510:revLst>
-    <p1510:client id="{ADDC1164-58C9-45DE-A57C-9F0D2B3828DA}" v="20" dt="2021-11-10T01:13:40.110"/>
+    <p1510:client id="{ADDC1164-58C9-45DE-A57C-9F0D2B3828DA}" v="22" dt="2021-11-10T16:38:08.230"/>
   </p1510:revLst>
 </p1510:revInfo>
 </file>
@@ -1116,11 +1117,34 @@
   </pc:docChgLst>
   <pc:docChgLst>
     <pc:chgData name="Ma Zhaoyuan" userId="52f0bd0a97ec5d39" providerId="LiveId" clId="{C59E44E9-7BB1-4716-B31D-493DA09E0F49}"/>
-    <pc:docChg chg="custSel modSld">
-      <pc:chgData name="Ma Zhaoyuan" userId="52f0bd0a97ec5d39" providerId="LiveId" clId="{C59E44E9-7BB1-4716-B31D-493DA09E0F49}" dt="2021-11-08T16:37:10.999" v="75" actId="20577"/>
+    <pc:docChg chg="undo custSel modSld">
+      <pc:chgData name="Ma Zhaoyuan" userId="52f0bd0a97ec5d39" providerId="LiveId" clId="{C59E44E9-7BB1-4716-B31D-493DA09E0F49}" dt="2021-11-10T18:39:43.891" v="143" actId="14734"/>
       <pc:docMkLst>
         <pc:docMk/>
       </pc:docMkLst>
+      <pc:sldChg chg="modSp mod">
+        <pc:chgData name="Ma Zhaoyuan" userId="52f0bd0a97ec5d39" providerId="LiveId" clId="{C59E44E9-7BB1-4716-B31D-493DA09E0F49}" dt="2021-11-10T18:39:43.891" v="143" actId="14734"/>
+        <pc:sldMkLst>
+          <pc:docMk/>
+          <pc:sldMk cId="1202855856" sldId="262"/>
+        </pc:sldMkLst>
+        <pc:spChg chg="mod">
+          <ac:chgData name="Ma Zhaoyuan" userId="52f0bd0a97ec5d39" providerId="LiveId" clId="{C59E44E9-7BB1-4716-B31D-493DA09E0F49}" dt="2021-11-10T18:37:57.947" v="76" actId="20577"/>
+          <ac:spMkLst>
+            <pc:docMk/>
+            <pc:sldMk cId="1202855856" sldId="262"/>
+            <ac:spMk id="3" creationId="{977DF643-00A5-4BFB-A07A-E1ED3B3E3C95}"/>
+          </ac:spMkLst>
+        </pc:spChg>
+        <pc:graphicFrameChg chg="modGraphic">
+          <ac:chgData name="Ma Zhaoyuan" userId="52f0bd0a97ec5d39" providerId="LiveId" clId="{C59E44E9-7BB1-4716-B31D-493DA09E0F49}" dt="2021-11-10T18:39:43.891" v="143" actId="14734"/>
+          <ac:graphicFrameMkLst>
+            <pc:docMk/>
+            <pc:sldMk cId="1202855856" sldId="262"/>
+            <ac:graphicFrameMk id="5" creationId="{50E63FBA-2BE9-43DC-B2A7-F1DD0BE06597}"/>
+          </ac:graphicFrameMkLst>
+        </pc:graphicFrameChg>
+      </pc:sldChg>
       <pc:sldChg chg="modSp mod">
         <pc:chgData name="Ma Zhaoyuan" userId="52f0bd0a97ec5d39" providerId="LiveId" clId="{C59E44E9-7BB1-4716-B31D-493DA09E0F49}" dt="2021-11-08T16:37:10.999" v="75" actId="20577"/>
         <pc:sldMkLst>
@@ -2815,7 +2839,7 @@
   <pc:docChgLst>
     <pc:chgData name="Ma Zhaoyuan" userId="52f0bd0a97ec5d39" providerId="LiveId" clId="{ADDC1164-58C9-45DE-A57C-9F0D2B3828DA}"/>
     <pc:docChg chg="undo custSel addSld modSld">
-      <pc:chgData name="Ma Zhaoyuan" userId="52f0bd0a97ec5d39" providerId="LiveId" clId="{ADDC1164-58C9-45DE-A57C-9F0D2B3828DA}" dt="2021-11-10T01:14:11.051" v="2096" actId="20577"/>
+      <pc:chgData name="Ma Zhaoyuan" userId="52f0bd0a97ec5d39" providerId="LiveId" clId="{ADDC1164-58C9-45DE-A57C-9F0D2B3828DA}" dt="2021-11-10T16:38:26.971" v="2134" actId="14100"/>
       <pc:docMkLst>
         <pc:docMk/>
       </pc:docMkLst>
@@ -3578,6 +3602,69 @@
             <ac:graphicFrameMk id="4" creationId="{1B009C8E-C4D0-47AA-820B-918113986EE4}"/>
           </ac:graphicFrameMkLst>
         </pc:graphicFrameChg>
+      </pc:sldChg>
+      <pc:sldChg chg="addSp delSp modSp new mod">
+        <pc:chgData name="Ma Zhaoyuan" userId="52f0bd0a97ec5d39" providerId="LiveId" clId="{ADDC1164-58C9-45DE-A57C-9F0D2B3828DA}" dt="2021-11-10T16:38:26.971" v="2134" actId="14100"/>
+        <pc:sldMkLst>
+          <pc:docMk/>
+          <pc:sldMk cId="1992085275" sldId="267"/>
+        </pc:sldMkLst>
+        <pc:spChg chg="mod">
+          <ac:chgData name="Ma Zhaoyuan" userId="52f0bd0a97ec5d39" providerId="LiveId" clId="{ADDC1164-58C9-45DE-A57C-9F0D2B3828DA}" dt="2021-11-10T16:37:26.945" v="2107" actId="20577"/>
+          <ac:spMkLst>
+            <pc:docMk/>
+            <pc:sldMk cId="1992085275" sldId="267"/>
+            <ac:spMk id="2" creationId="{0815F2B1-AFE1-4664-BD6D-89D5F22C6FB5}"/>
+          </ac:spMkLst>
+        </pc:spChg>
+        <pc:spChg chg="del">
+          <ac:chgData name="Ma Zhaoyuan" userId="52f0bd0a97ec5d39" providerId="LiveId" clId="{ADDC1164-58C9-45DE-A57C-9F0D2B3828DA}" dt="2021-11-10T16:37:14.922" v="2098" actId="478"/>
+          <ac:spMkLst>
+            <pc:docMk/>
+            <pc:sldMk cId="1992085275" sldId="267"/>
+            <ac:spMk id="3" creationId="{8ADC2346-FD68-438E-B38D-75392C8244D8}"/>
+          </ac:spMkLst>
+        </pc:spChg>
+        <pc:spChg chg="add mod">
+          <ac:chgData name="Ma Zhaoyuan" userId="52f0bd0a97ec5d39" providerId="LiveId" clId="{ADDC1164-58C9-45DE-A57C-9F0D2B3828DA}" dt="2021-11-10T16:38:23.824" v="2133" actId="1076"/>
+          <ac:spMkLst>
+            <pc:docMk/>
+            <pc:sldMk cId="1992085275" sldId="267"/>
+            <ac:spMk id="6" creationId="{941FD32C-BD53-4840-8C1B-0C1CB46ADB23}"/>
+          </ac:spMkLst>
+        </pc:spChg>
+        <pc:spChg chg="add mod">
+          <ac:chgData name="Ma Zhaoyuan" userId="52f0bd0a97ec5d39" providerId="LiveId" clId="{ADDC1164-58C9-45DE-A57C-9F0D2B3828DA}" dt="2021-11-10T16:38:15.664" v="2130" actId="20577"/>
+          <ac:spMkLst>
+            <pc:docMk/>
+            <pc:sldMk cId="1992085275" sldId="267"/>
+            <ac:spMk id="9" creationId="{20906F12-CD33-4356-9B34-C70D895B6CC8}"/>
+          </ac:spMkLst>
+        </pc:spChg>
+        <pc:picChg chg="add mod modCrop">
+          <ac:chgData name="Ma Zhaoyuan" userId="52f0bd0a97ec5d39" providerId="LiveId" clId="{ADDC1164-58C9-45DE-A57C-9F0D2B3828DA}" dt="2021-11-10T16:37:25.504" v="2104" actId="1076"/>
+          <ac:picMkLst>
+            <pc:docMk/>
+            <pc:sldMk cId="1992085275" sldId="267"/>
+            <ac:picMk id="5" creationId="{62A6AF89-D307-476E-8DE1-4BA9B68B9BD2}"/>
+          </ac:picMkLst>
+        </pc:picChg>
+        <pc:cxnChg chg="add mod">
+          <ac:chgData name="Ma Zhaoyuan" userId="52f0bd0a97ec5d39" providerId="LiveId" clId="{ADDC1164-58C9-45DE-A57C-9F0D2B3828DA}" dt="2021-11-10T16:38:26.971" v="2134" actId="14100"/>
+          <ac:cxnSpMkLst>
+            <pc:docMk/>
+            <pc:sldMk cId="1992085275" sldId="267"/>
+            <ac:cxnSpMk id="8" creationId="{15ACBFAB-FB34-4B21-BF9A-9466CB13F0F7}"/>
+          </ac:cxnSpMkLst>
+        </pc:cxnChg>
+        <pc:cxnChg chg="add mod">
+          <ac:chgData name="Ma Zhaoyuan" userId="52f0bd0a97ec5d39" providerId="LiveId" clId="{ADDC1164-58C9-45DE-A57C-9F0D2B3828DA}" dt="2021-11-10T16:38:13.680" v="2128" actId="14100"/>
+          <ac:cxnSpMkLst>
+            <pc:docMk/>
+            <pc:sldMk cId="1992085275" sldId="267"/>
+            <ac:cxnSpMk id="10" creationId="{AA822BB5-67F6-49D4-A096-9850449223A1}"/>
+          </ac:cxnSpMkLst>
+        </pc:cxnChg>
       </pc:sldChg>
     </pc:docChg>
   </pc:docChgLst>
@@ -7024,7 +7111,7 @@
           <a:p>
             <a:fld id="{DB45A83E-2ABB-4C31-A40E-B3E9C7C5979E}" type="datetimeFigureOut">
               <a:rPr lang="en-US" smtClean="0"/>
-              <a:t>11/9/2021</a:t>
+              <a:t>11/10/2021</a:t>
             </a:fld>
             <a:endParaRPr lang="en-US"/>
           </a:p>
@@ -7522,7 +7609,7 @@
           <a:p>
             <a:fld id="{385D109A-F3B7-4659-9388-BA4D0E165B75}" type="datetimeFigureOut">
               <a:rPr lang="en-US" smtClean="0"/>
-              <a:t>11/9/2021</a:t>
+              <a:t>11/10/2021</a:t>
             </a:fld>
             <a:endParaRPr lang="en-US"/>
           </a:p>
@@ -7720,7 +7807,7 @@
           <a:p>
             <a:fld id="{385D109A-F3B7-4659-9388-BA4D0E165B75}" type="datetimeFigureOut">
               <a:rPr lang="en-US" smtClean="0"/>
-              <a:t>11/9/2021</a:t>
+              <a:t>11/10/2021</a:t>
             </a:fld>
             <a:endParaRPr lang="en-US"/>
           </a:p>
@@ -7928,7 +8015,7 @@
           <a:p>
             <a:fld id="{385D109A-F3B7-4659-9388-BA4D0E165B75}" type="datetimeFigureOut">
               <a:rPr lang="en-US" smtClean="0"/>
-              <a:t>11/9/2021</a:t>
+              <a:t>11/10/2021</a:t>
             </a:fld>
             <a:endParaRPr lang="en-US"/>
           </a:p>
@@ -8126,7 +8213,7 @@
           <a:p>
             <a:fld id="{385D109A-F3B7-4659-9388-BA4D0E165B75}" type="datetimeFigureOut">
               <a:rPr lang="en-US" smtClean="0"/>
-              <a:t>11/9/2021</a:t>
+              <a:t>11/10/2021</a:t>
             </a:fld>
             <a:endParaRPr lang="en-US"/>
           </a:p>
@@ -8401,7 +8488,7 @@
           <a:p>
             <a:fld id="{385D109A-F3B7-4659-9388-BA4D0E165B75}" type="datetimeFigureOut">
               <a:rPr lang="en-US" smtClean="0"/>
-              <a:t>11/9/2021</a:t>
+              <a:t>11/10/2021</a:t>
             </a:fld>
             <a:endParaRPr lang="en-US"/>
           </a:p>
@@ -8666,7 +8753,7 @@
           <a:p>
             <a:fld id="{385D109A-F3B7-4659-9388-BA4D0E165B75}" type="datetimeFigureOut">
               <a:rPr lang="en-US" smtClean="0"/>
-              <a:t>11/9/2021</a:t>
+              <a:t>11/10/2021</a:t>
             </a:fld>
             <a:endParaRPr lang="en-US"/>
           </a:p>
@@ -9078,7 +9165,7 @@
           <a:p>
             <a:fld id="{385D109A-F3B7-4659-9388-BA4D0E165B75}" type="datetimeFigureOut">
               <a:rPr lang="en-US" smtClean="0"/>
-              <a:t>11/9/2021</a:t>
+              <a:t>11/10/2021</a:t>
             </a:fld>
             <a:endParaRPr lang="en-US"/>
           </a:p>
@@ -9219,7 +9306,7 @@
           <a:p>
             <a:fld id="{385D109A-F3B7-4659-9388-BA4D0E165B75}" type="datetimeFigureOut">
               <a:rPr lang="en-US" smtClean="0"/>
-              <a:t>11/9/2021</a:t>
+              <a:t>11/10/2021</a:t>
             </a:fld>
             <a:endParaRPr lang="en-US"/>
           </a:p>
@@ -9332,7 +9419,7 @@
           <a:p>
             <a:fld id="{385D109A-F3B7-4659-9388-BA4D0E165B75}" type="datetimeFigureOut">
               <a:rPr lang="en-US" smtClean="0"/>
-              <a:t>11/9/2021</a:t>
+              <a:t>11/10/2021</a:t>
             </a:fld>
             <a:endParaRPr lang="en-US"/>
           </a:p>
@@ -9643,7 +9730,7 @@
           <a:p>
             <a:fld id="{385D109A-F3B7-4659-9388-BA4D0E165B75}" type="datetimeFigureOut">
               <a:rPr lang="en-US" smtClean="0"/>
-              <a:t>11/9/2021</a:t>
+              <a:t>11/10/2021</a:t>
             </a:fld>
             <a:endParaRPr lang="en-US"/>
           </a:p>
@@ -9931,7 +10018,7 @@
           <a:p>
             <a:fld id="{385D109A-F3B7-4659-9388-BA4D0E165B75}" type="datetimeFigureOut">
               <a:rPr lang="en-US" smtClean="0"/>
-              <a:t>11/9/2021</a:t>
+              <a:t>11/10/2021</a:t>
             </a:fld>
             <a:endParaRPr lang="en-US"/>
           </a:p>
@@ -10172,7 +10259,7 @@
           <a:p>
             <a:fld id="{385D109A-F3B7-4659-9388-BA4D0E165B75}" type="datetimeFigureOut">
               <a:rPr lang="en-US" smtClean="0"/>
-              <a:t>11/9/2021</a:t>
+              <a:t>11/10/2021</a:t>
             </a:fld>
             <a:endParaRPr lang="en-US"/>
           </a:p>
@@ -11589,6 +11676,9 @@
             <a:endParaRPr lang="en-US" dirty="0"/>
           </a:p>
           <a:p>
+            <a:endParaRPr lang="en-US" dirty="0"/>
+          </a:p>
+          <a:p>
             <a:r>
               <a:rPr lang="en-US" dirty="0"/>
               <a:t>Reward:</a:t>
@@ -11625,7 +11715,7 @@
           <p:nvPr>
             <p:extLst>
               <p:ext uri="{D42A27DB-BD31-4B8C-83A1-F6EECF244321}">
-                <p14:modId xmlns:p14="http://schemas.microsoft.com/office/powerpoint/2010/main" val="2747278729"/>
+                <p14:modId xmlns:p14="http://schemas.microsoft.com/office/powerpoint/2010/main" val="775465298"/>
               </p:ext>
             </p:extLst>
           </p:nvPr>
@@ -11641,35 +11731,42 @@
                 <a:tableStyleId>{5C22544A-7EE6-4342-B048-85BDC9FD1C3A}</a:tableStyleId>
               </a:tblPr>
               <a:tblGrid>
-                <a:gridCol w="1928229">
+                <a:gridCol w="1049644">
                   <a:extLst>
                     <a:ext uri="{9D8B030D-6E8A-4147-A177-3AD203B41FA5}">
                       <a16:colId xmlns:a16="http://schemas.microsoft.com/office/drawing/2014/main" val="3852810974"/>
                     </a:ext>
                   </a:extLst>
                 </a:gridCol>
-                <a:gridCol w="1928229">
+                <a:gridCol w="1712827">
                   <a:extLst>
                     <a:ext uri="{9D8B030D-6E8A-4147-A177-3AD203B41FA5}">
                       <a16:colId xmlns:a16="http://schemas.microsoft.com/office/drawing/2014/main" val="505222439"/>
                     </a:ext>
                   </a:extLst>
                 </a:gridCol>
-                <a:gridCol w="1928229">
+                <a:gridCol w="1503185">
                   <a:extLst>
                     <a:ext uri="{9D8B030D-6E8A-4147-A177-3AD203B41FA5}">
                       <a16:colId xmlns:a16="http://schemas.microsoft.com/office/drawing/2014/main" val="1788938975"/>
                     </a:ext>
                   </a:extLst>
                 </a:gridCol>
-                <a:gridCol w="1928229">
+                <a:gridCol w="1436277">
                   <a:extLst>
                     <a:ext uri="{9D8B030D-6E8A-4147-A177-3AD203B41FA5}">
                       <a16:colId xmlns:a16="http://schemas.microsoft.com/office/drawing/2014/main" val="1976107575"/>
                     </a:ext>
                   </a:extLst>
                 </a:gridCol>
-                <a:gridCol w="1928229">
+                <a:gridCol w="1721748">
+                  <a:extLst>
+                    <a:ext uri="{9D8B030D-6E8A-4147-A177-3AD203B41FA5}">
+                      <a16:colId xmlns:a16="http://schemas.microsoft.com/office/drawing/2014/main" val="1464474423"/>
+                    </a:ext>
+                  </a:extLst>
+                </a:gridCol>
+                <a:gridCol w="2217464">
                   <a:extLst>
                     <a:ext uri="{9D8B030D-6E8A-4147-A177-3AD203B41FA5}">
                       <a16:colId xmlns:a16="http://schemas.microsoft.com/office/drawing/2014/main" val="444248507"/>
@@ -11722,6 +11819,19 @@
                       <a:r>
                         <a:rPr lang="en-US" dirty="0"/>
                         <a:t>1 (int)</a:t>
+                      </a:r>
+                    </a:p>
+                  </a:txBody>
+                  <a:tcPr/>
+                </a:tc>
+                <a:tc>
+                  <a:txBody>
+                    <a:bodyPr/>
+                    <a:lstStyle/>
+                    <a:p>
+                      <a:r>
+                        <a:rPr lang="en-US" dirty="0"/>
+                        <a:t>2(int)</a:t>
                       </a:r>
                     </a:p>
                   </a:txBody>
@@ -11795,6 +11905,16 @@
                         <a:rPr lang="en-US" dirty="0"/>
                         <a:t>move right</a:t>
                       </a:r>
+                    </a:p>
+                  </a:txBody>
+                  <a:tcPr/>
+                </a:tc>
+                <a:tc>
+                  <a:txBody>
+                    <a:bodyPr/>
+                    <a:lstStyle/>
+                    <a:p>
+                      <a:endParaRPr lang="en-US" dirty="0"/>
                     </a:p>
                   </a:txBody>
                   <a:tcPr/>
@@ -11910,6 +12030,33 @@
                         <a:tabLst/>
                         <a:defRPr/>
                       </a:pPr>
+                      <a:endParaRPr lang="en-US" dirty="0"/>
+                    </a:p>
+                  </a:txBody>
+                  <a:tcPr/>
+                </a:tc>
+                <a:tc>
+                  <a:txBody>
+                    <a:bodyPr/>
+                    <a:lstStyle/>
+                    <a:p>
+                      <a:pPr marL="0" marR="0" lvl="0" indent="0" algn="l" defTabSz="914400" rtl="0" eaLnBrk="1" fontAlgn="auto" latinLnBrk="0" hangingPunct="1">
+                        <a:lnSpc>
+                          <a:spcPct val="100000"/>
+                        </a:lnSpc>
+                        <a:spcBef>
+                          <a:spcPts val="0"/>
+                        </a:spcBef>
+                        <a:spcAft>
+                          <a:spcPts val="0"/>
+                        </a:spcAft>
+                        <a:buClrTx/>
+                        <a:buSzTx/>
+                        <a:buFontTx/>
+                        <a:buNone/>
+                        <a:tabLst/>
+                        <a:defRPr/>
+                      </a:pPr>
                       <a:r>
                         <a:rPr lang="en-US" dirty="0"/>
                         <a:t>N/A</a:t>
@@ -11983,6 +12130,20 @@
                     <a:lstStyle/>
                     <a:p>
                       <a:r>
+                        <a:rPr lang="en-US"/>
+                        <a:t>extend sections</a:t>
+                      </a:r>
+                      <a:endParaRPr lang="en-US" dirty="0"/>
+                    </a:p>
+                  </a:txBody>
+                  <a:tcPr/>
+                </a:tc>
+                <a:tc>
+                  <a:txBody>
+                    <a:bodyPr/>
+                    <a:lstStyle/>
+                    <a:p>
+                      <a:r>
                         <a:rPr lang="en-US" dirty="0"/>
                         <a:t>N/A</a:t>
                       </a:r>
@@ -12045,6 +12206,16 @@
                         <a:rPr lang="en-US" dirty="0"/>
                         <a:t>N/A</a:t>
                       </a:r>
+                    </a:p>
+                  </a:txBody>
+                  <a:tcPr/>
+                </a:tc>
+                <a:tc>
+                  <a:txBody>
+                    <a:bodyPr/>
+                    <a:lstStyle/>
+                    <a:p>
+                      <a:endParaRPr lang="en-US" dirty="0"/>
                     </a:p>
                   </a:txBody>
                   <a:tcPr/>
@@ -12151,6 +12322,33 @@
                         <a:rPr lang="en-US" dirty="0"/>
                         <a:t>N/A</a:t>
                       </a:r>
+                    </a:p>
+                  </a:txBody>
+                  <a:tcPr/>
+                </a:tc>
+                <a:tc>
+                  <a:txBody>
+                    <a:bodyPr/>
+                    <a:lstStyle/>
+                    <a:p>
+                      <a:pPr marL="0" marR="0" lvl="0" indent="0" algn="l" defTabSz="914400" rtl="0" eaLnBrk="1" fontAlgn="auto" latinLnBrk="0" hangingPunct="1">
+                        <a:lnSpc>
+                          <a:spcPct val="100000"/>
+                        </a:lnSpc>
+                        <a:spcBef>
+                          <a:spcPts val="0"/>
+                        </a:spcBef>
+                        <a:spcAft>
+                          <a:spcPts val="0"/>
+                        </a:spcAft>
+                        <a:buClrTx/>
+                        <a:buSzTx/>
+                        <a:buFontTx/>
+                        <a:buNone/>
+                        <a:tabLst/>
+                        <a:defRPr/>
+                      </a:pPr>
+                      <a:endParaRPr lang="en-US" dirty="0"/>
                     </a:p>
                   </a:txBody>
                   <a:tcPr/>
@@ -17561,6 +17759,279 @@
 </p:sld>
 </file>
 
+<file path=ppt/slides/slide9.xml><?xml version="1.0" encoding="utf-8"?>
+<p:sld xmlns:a="http://schemas.openxmlformats.org/drawingml/2006/main" xmlns:r="http://schemas.openxmlformats.org/officeDocument/2006/relationships" xmlns:p="http://schemas.openxmlformats.org/presentationml/2006/main">
+  <p:cSld>
+    <p:spTree>
+      <p:nvGrpSpPr>
+        <p:cNvPr id="1" name=""/>
+        <p:cNvGrpSpPr/>
+        <p:nvPr/>
+      </p:nvGrpSpPr>
+      <p:grpSpPr>
+        <a:xfrm>
+          <a:off x="0" y="0"/>
+          <a:ext cx="0" cy="0"/>
+          <a:chOff x="0" y="0"/>
+          <a:chExt cx="0" cy="0"/>
+        </a:xfrm>
+      </p:grpSpPr>
+      <p:sp>
+        <p:nvSpPr>
+          <p:cNvPr id="2" name="Title 1">
+            <a:extLst>
+              <a:ext uri="{FF2B5EF4-FFF2-40B4-BE49-F238E27FC236}">
+                <a16:creationId xmlns:a16="http://schemas.microsoft.com/office/drawing/2014/main" id="{0815F2B1-AFE1-4664-BD6D-89D5F22C6FB5}"/>
+              </a:ext>
+            </a:extLst>
+          </p:cNvPr>
+          <p:cNvSpPr>
+            <a:spLocks noGrp="1"/>
+          </p:cNvSpPr>
+          <p:nvPr>
+            <p:ph type="title"/>
+          </p:nvPr>
+        </p:nvSpPr>
+        <p:spPr/>
+        <p:txBody>
+          <a:bodyPr/>
+          <a:lstStyle/>
+          <a:p>
+            <a:r>
+              <a:rPr lang="en-US" dirty="0"/>
+              <a:t>Bug</a:t>
+            </a:r>
+          </a:p>
+        </p:txBody>
+      </p:sp>
+      <p:pic>
+        <p:nvPicPr>
+          <p:cNvPr id="5" name="Picture 4" descr="A picture containing schematic&#10;&#10;Description automatically generated">
+            <a:extLst>
+              <a:ext uri="{FF2B5EF4-FFF2-40B4-BE49-F238E27FC236}">
+                <a16:creationId xmlns:a16="http://schemas.microsoft.com/office/drawing/2014/main" id="{62A6AF89-D307-476E-8DE1-4BA9B68B9BD2}"/>
+              </a:ext>
+            </a:extLst>
+          </p:cNvPr>
+          <p:cNvPicPr>
+            <a:picLocks noChangeAspect="1"/>
+          </p:cNvPicPr>
+          <p:nvPr/>
+        </p:nvPicPr>
+        <p:blipFill rotWithShape="1">
+          <a:blip r:embed="rId2">
+            <a:extLst>
+              <a:ext uri="{28A0092B-C50C-407E-A947-70E740481C1C}">
+                <a14:useLocalDpi xmlns:a14="http://schemas.microsoft.com/office/drawing/2010/main" val="0"/>
+              </a:ext>
+            </a:extLst>
+          </a:blip>
+          <a:srcRect t="7941" b="23909"/>
+          <a:stretch/>
+        </p:blipFill>
+        <p:spPr>
+          <a:xfrm>
+            <a:off x="2607536" y="2817846"/>
+            <a:ext cx="6697010" cy="3862873"/>
+          </a:xfrm>
+          <a:prstGeom prst="rect">
+            <a:avLst/>
+          </a:prstGeom>
+        </p:spPr>
+      </p:pic>
+      <p:sp>
+        <p:nvSpPr>
+          <p:cNvPr id="6" name="Rectangle 5">
+            <a:extLst>
+              <a:ext uri="{FF2B5EF4-FFF2-40B4-BE49-F238E27FC236}">
+                <a16:creationId xmlns:a16="http://schemas.microsoft.com/office/drawing/2014/main" id="{941FD32C-BD53-4840-8C1B-0C1CB46ADB23}"/>
+              </a:ext>
+            </a:extLst>
+          </p:cNvPr>
+          <p:cNvSpPr/>
+          <p:nvPr/>
+        </p:nvSpPr>
+        <p:spPr>
+          <a:xfrm>
+            <a:off x="5262284" y="2428269"/>
+            <a:ext cx="904617" cy="521337"/>
+          </a:xfrm>
+          <a:prstGeom prst="rect">
+            <a:avLst/>
+          </a:prstGeom>
+          <a:ln w="28575"/>
+        </p:spPr>
+        <p:style>
+          <a:lnRef idx="2">
+            <a:schemeClr val="dk1"/>
+          </a:lnRef>
+          <a:fillRef idx="1">
+            <a:schemeClr val="lt1"/>
+          </a:fillRef>
+          <a:effectRef idx="0">
+            <a:schemeClr val="dk1"/>
+          </a:effectRef>
+          <a:fontRef idx="minor">
+            <a:schemeClr val="dk1"/>
+          </a:fontRef>
+        </p:style>
+        <p:txBody>
+          <a:bodyPr rtlCol="0" anchor="ctr"/>
+          <a:lstStyle/>
+          <a:p>
+            <a:pPr algn="ctr"/>
+            <a:r>
+              <a:rPr lang="en-US" dirty="0"/>
+              <a:t>No. 9</a:t>
+            </a:r>
+          </a:p>
+        </p:txBody>
+      </p:sp>
+      <p:cxnSp>
+        <p:nvCxnSpPr>
+          <p:cNvPr id="8" name="Straight Arrow Connector 7">
+            <a:extLst>
+              <a:ext uri="{FF2B5EF4-FFF2-40B4-BE49-F238E27FC236}">
+                <a16:creationId xmlns:a16="http://schemas.microsoft.com/office/drawing/2014/main" id="{15ACBFAB-FB34-4B21-BF9A-9466CB13F0F7}"/>
+              </a:ext>
+            </a:extLst>
+          </p:cNvPr>
+          <p:cNvCxnSpPr>
+            <a:cxnSpLocks/>
+            <a:stCxn id="6" idx="2"/>
+          </p:cNvCxnSpPr>
+          <p:nvPr/>
+        </p:nvCxnSpPr>
+        <p:spPr>
+          <a:xfrm>
+            <a:off x="5714593" y="2949606"/>
+            <a:ext cx="381407" cy="2137299"/>
+          </a:xfrm>
+          <a:prstGeom prst="straightConnector1">
+            <a:avLst/>
+          </a:prstGeom>
+          <a:ln w="28575">
+            <a:tailEnd type="triangle"/>
+          </a:ln>
+        </p:spPr>
+        <p:style>
+          <a:lnRef idx="1">
+            <a:schemeClr val="dk1"/>
+          </a:lnRef>
+          <a:fillRef idx="0">
+            <a:schemeClr val="dk1"/>
+          </a:fillRef>
+          <a:effectRef idx="0">
+            <a:schemeClr val="dk1"/>
+          </a:effectRef>
+          <a:fontRef idx="minor">
+            <a:schemeClr val="tx1"/>
+          </a:fontRef>
+        </p:style>
+      </p:cxnSp>
+      <p:sp>
+        <p:nvSpPr>
+          <p:cNvPr id="9" name="Rectangle 8">
+            <a:extLst>
+              <a:ext uri="{FF2B5EF4-FFF2-40B4-BE49-F238E27FC236}">
+                <a16:creationId xmlns:a16="http://schemas.microsoft.com/office/drawing/2014/main" id="{20906F12-CD33-4356-9B34-C70D895B6CC8}"/>
+              </a:ext>
+            </a:extLst>
+          </p:cNvPr>
+          <p:cNvSpPr/>
+          <p:nvPr/>
+        </p:nvSpPr>
+        <p:spPr>
+          <a:xfrm>
+            <a:off x="7113399" y="2817846"/>
+            <a:ext cx="904617" cy="521337"/>
+          </a:xfrm>
+          <a:prstGeom prst="rect">
+            <a:avLst/>
+          </a:prstGeom>
+          <a:ln w="28575"/>
+        </p:spPr>
+        <p:style>
+          <a:lnRef idx="2">
+            <a:schemeClr val="dk1"/>
+          </a:lnRef>
+          <a:fillRef idx="1">
+            <a:schemeClr val="lt1"/>
+          </a:fillRef>
+          <a:effectRef idx="0">
+            <a:schemeClr val="dk1"/>
+          </a:effectRef>
+          <a:fontRef idx="minor">
+            <a:schemeClr val="dk1"/>
+          </a:fontRef>
+        </p:style>
+        <p:txBody>
+          <a:bodyPr rtlCol="0" anchor="ctr"/>
+          <a:lstStyle/>
+          <a:p>
+            <a:pPr algn="ctr"/>
+            <a:r>
+              <a:rPr lang="en-US" dirty="0"/>
+              <a:t>No. 22</a:t>
+            </a:r>
+          </a:p>
+        </p:txBody>
+      </p:sp>
+      <p:cxnSp>
+        <p:nvCxnSpPr>
+          <p:cNvPr id="10" name="Straight Arrow Connector 9">
+            <a:extLst>
+              <a:ext uri="{FF2B5EF4-FFF2-40B4-BE49-F238E27FC236}">
+                <a16:creationId xmlns:a16="http://schemas.microsoft.com/office/drawing/2014/main" id="{AA822BB5-67F6-49D4-A096-9850449223A1}"/>
+              </a:ext>
+            </a:extLst>
+          </p:cNvPr>
+          <p:cNvCxnSpPr>
+            <a:cxnSpLocks/>
+            <a:stCxn id="9" idx="2"/>
+          </p:cNvCxnSpPr>
+          <p:nvPr/>
+        </p:nvCxnSpPr>
+        <p:spPr>
+          <a:xfrm flipH="1">
+            <a:off x="6572428" y="3339183"/>
+            <a:ext cx="993280" cy="1090774"/>
+          </a:xfrm>
+          <a:prstGeom prst="straightConnector1">
+            <a:avLst/>
+          </a:prstGeom>
+          <a:ln w="28575">
+            <a:tailEnd type="triangle"/>
+          </a:ln>
+        </p:spPr>
+        <p:style>
+          <a:lnRef idx="1">
+            <a:schemeClr val="dk1"/>
+          </a:lnRef>
+          <a:fillRef idx="0">
+            <a:schemeClr val="dk1"/>
+          </a:fillRef>
+          <a:effectRef idx="0">
+            <a:schemeClr val="dk1"/>
+          </a:effectRef>
+          <a:fontRef idx="minor">
+            <a:schemeClr val="tx1"/>
+          </a:fontRef>
+        </p:style>
+      </p:cxnSp>
+    </p:spTree>
+    <p:extLst>
+      <p:ext uri="{BB962C8B-B14F-4D97-AF65-F5344CB8AC3E}">
+        <p14:creationId xmlns:p14="http://schemas.microsoft.com/office/powerpoint/2010/main" val="1992085275"/>
+      </p:ext>
+    </p:extLst>
+  </p:cSld>
+  <p:clrMapOvr>
+    <a:masterClrMapping/>
+  </p:clrMapOvr>
+</p:sld>
+</file>
+
 <file path=ppt/theme/theme1.xml><?xml version="1.0" encoding="utf-8"?>
 <a:theme xmlns:a="http://schemas.openxmlformats.org/drawingml/2006/main" name="Office Theme">
   <a:themeElements>

</xml_diff>

<commit_message>
automatic wiring demo v1.0
</commit_message>
<xml_diff>
--- a/readme.pptx
+++ b/readme.pptx
@@ -126,7 +126,7 @@
 <file path=ppt/revisionInfo.xml><?xml version="1.0" encoding="utf-8"?>
 <p1510:revInfo xmlns:a="http://schemas.openxmlformats.org/drawingml/2006/main" xmlns:r="http://schemas.openxmlformats.org/officeDocument/2006/relationships" xmlns:p1510="http://schemas.microsoft.com/office/powerpoint/2015/10/main">
   <p1510:revLst>
-    <p1510:client id="{ADDC1164-58C9-45DE-A57C-9F0D2B3828DA}" v="22" dt="2021-11-10T16:38:08.230"/>
+    <p1510:client id="{ADDC1164-58C9-45DE-A57C-9F0D2B3828DA}" v="88" dt="2021-11-16T02:13:18.985"/>
   </p1510:revLst>
 </p1510:revInfo>
 </file>
@@ -1118,26 +1118,26 @@
   <pc:docChgLst>
     <pc:chgData name="Ma Zhaoyuan" userId="52f0bd0a97ec5d39" providerId="LiveId" clId="{C59E44E9-7BB1-4716-B31D-493DA09E0F49}"/>
     <pc:docChg chg="undo custSel modSld">
-      <pc:chgData name="Ma Zhaoyuan" userId="52f0bd0a97ec5d39" providerId="LiveId" clId="{C59E44E9-7BB1-4716-B31D-493DA09E0F49}" dt="2021-11-10T18:39:43.891" v="143" actId="14734"/>
+      <pc:chgData name="Ma Zhaoyuan" userId="52f0bd0a97ec5d39" providerId="LiveId" clId="{C59E44E9-7BB1-4716-B31D-493DA09E0F49}" dt="2021-11-12T21:54:46.967" v="294" actId="20577"/>
       <pc:docMkLst>
         <pc:docMk/>
       </pc:docMkLst>
       <pc:sldChg chg="modSp mod">
-        <pc:chgData name="Ma Zhaoyuan" userId="52f0bd0a97ec5d39" providerId="LiveId" clId="{C59E44E9-7BB1-4716-B31D-493DA09E0F49}" dt="2021-11-10T18:39:43.891" v="143" actId="14734"/>
+        <pc:chgData name="Ma Zhaoyuan" userId="52f0bd0a97ec5d39" providerId="LiveId" clId="{C59E44E9-7BB1-4716-B31D-493DA09E0F49}" dt="2021-11-12T21:54:46.967" v="294" actId="20577"/>
         <pc:sldMkLst>
           <pc:docMk/>
           <pc:sldMk cId="1202855856" sldId="262"/>
         </pc:sldMkLst>
         <pc:spChg chg="mod">
-          <ac:chgData name="Ma Zhaoyuan" userId="52f0bd0a97ec5d39" providerId="LiveId" clId="{C59E44E9-7BB1-4716-B31D-493DA09E0F49}" dt="2021-11-10T18:37:57.947" v="76" actId="20577"/>
+          <ac:chgData name="Ma Zhaoyuan" userId="52f0bd0a97ec5d39" providerId="LiveId" clId="{C59E44E9-7BB1-4716-B31D-493DA09E0F49}" dt="2021-11-12T21:53:17.527" v="198" actId="20577"/>
           <ac:spMkLst>
             <pc:docMk/>
             <pc:sldMk cId="1202855856" sldId="262"/>
             <ac:spMk id="3" creationId="{977DF643-00A5-4BFB-A07A-E1ED3B3E3C95}"/>
           </ac:spMkLst>
         </pc:spChg>
-        <pc:graphicFrameChg chg="modGraphic">
-          <ac:chgData name="Ma Zhaoyuan" userId="52f0bd0a97ec5d39" providerId="LiveId" clId="{C59E44E9-7BB1-4716-B31D-493DA09E0F49}" dt="2021-11-10T18:39:43.891" v="143" actId="14734"/>
+        <pc:graphicFrameChg chg="mod modGraphic">
+          <ac:chgData name="Ma Zhaoyuan" userId="52f0bd0a97ec5d39" providerId="LiveId" clId="{C59E44E9-7BB1-4716-B31D-493DA09E0F49}" dt="2021-11-12T21:54:46.967" v="294" actId="20577"/>
           <ac:graphicFrameMkLst>
             <pc:docMk/>
             <pc:sldMk cId="1202855856" sldId="262"/>
@@ -2839,7 +2839,7 @@
   <pc:docChgLst>
     <pc:chgData name="Ma Zhaoyuan" userId="52f0bd0a97ec5d39" providerId="LiveId" clId="{ADDC1164-58C9-45DE-A57C-9F0D2B3828DA}"/>
     <pc:docChg chg="undo custSel addSld modSld">
-      <pc:chgData name="Ma Zhaoyuan" userId="52f0bd0a97ec5d39" providerId="LiveId" clId="{ADDC1164-58C9-45DE-A57C-9F0D2B3828DA}" dt="2021-11-10T16:38:26.971" v="2134" actId="14100"/>
+      <pc:chgData name="Ma Zhaoyuan" userId="52f0bd0a97ec5d39" providerId="LiveId" clId="{ADDC1164-58C9-45DE-A57C-9F0D2B3828DA}" dt="2021-11-16T02:13:38.835" v="2432" actId="14734"/>
       <pc:docMkLst>
         <pc:docMk/>
       </pc:docMkLst>
@@ -3337,7 +3337,7 @@
         </pc:cxnChg>
       </pc:sldChg>
       <pc:sldChg chg="addSp delSp modSp new mod">
-        <pc:chgData name="Ma Zhaoyuan" userId="52f0bd0a97ec5d39" providerId="LiveId" clId="{ADDC1164-58C9-45DE-A57C-9F0D2B3828DA}" dt="2021-11-03T03:57:49.469" v="1247" actId="20577"/>
+        <pc:chgData name="Ma Zhaoyuan" userId="52f0bd0a97ec5d39" providerId="LiveId" clId="{ADDC1164-58C9-45DE-A57C-9F0D2B3828DA}" dt="2021-11-16T02:13:38.835" v="2432" actId="14734"/>
         <pc:sldMkLst>
           <pc:docMk/>
           <pc:sldMk cId="1202855856" sldId="262"/>
@@ -3366,8 +3366,8 @@
             <ac:graphicFrameMk id="4" creationId="{5B5CC41F-F174-4876-85A8-03E8040BAE3C}"/>
           </ac:graphicFrameMkLst>
         </pc:graphicFrameChg>
-        <pc:graphicFrameChg chg="add mod">
-          <ac:chgData name="Ma Zhaoyuan" userId="52f0bd0a97ec5d39" providerId="LiveId" clId="{ADDC1164-58C9-45DE-A57C-9F0D2B3828DA}" dt="2021-11-03T03:56:56.163" v="1158"/>
+        <pc:graphicFrameChg chg="add mod modGraphic">
+          <ac:chgData name="Ma Zhaoyuan" userId="52f0bd0a97ec5d39" providerId="LiveId" clId="{ADDC1164-58C9-45DE-A57C-9F0D2B3828DA}" dt="2021-11-16T02:13:38.835" v="2432" actId="14734"/>
           <ac:graphicFrameMkLst>
             <pc:docMk/>
             <pc:sldMk cId="1202855856" sldId="262"/>
@@ -3414,7 +3414,7 @@
         </pc:spChg>
       </pc:sldChg>
       <pc:sldChg chg="addSp delSp modSp new mod">
-        <pc:chgData name="Ma Zhaoyuan" userId="52f0bd0a97ec5d39" providerId="LiveId" clId="{ADDC1164-58C9-45DE-A57C-9F0D2B3828DA}" dt="2021-11-09T02:33:35.746" v="1473" actId="20577"/>
+        <pc:chgData name="Ma Zhaoyuan" userId="52f0bd0a97ec5d39" providerId="LiveId" clId="{ADDC1164-58C9-45DE-A57C-9F0D2B3828DA}" dt="2021-11-13T15:37:41.059" v="2192" actId="14100"/>
         <pc:sldMkLst>
           <pc:docMk/>
           <pc:sldMk cId="1690221253" sldId="265"/>
@@ -3497,6 +3497,38 @@
             <pc:docMk/>
             <pc:sldMk cId="1690221253" sldId="265"/>
             <ac:spMk id="16" creationId="{30856A99-037E-4968-B60E-7C74A8730AD6}"/>
+          </ac:spMkLst>
+        </pc:spChg>
+        <pc:spChg chg="add mod">
+          <ac:chgData name="Ma Zhaoyuan" userId="52f0bd0a97ec5d39" providerId="LiveId" clId="{ADDC1164-58C9-45DE-A57C-9F0D2B3828DA}" dt="2021-11-13T15:36:43.739" v="2149" actId="5793"/>
+          <ac:spMkLst>
+            <pc:docMk/>
+            <pc:sldMk cId="1690221253" sldId="265"/>
+            <ac:spMk id="20" creationId="{AF099107-D8A5-420D-AA09-6D54CA1453B9}"/>
+          </ac:spMkLst>
+        </pc:spChg>
+        <pc:spChg chg="add mod">
+          <ac:chgData name="Ma Zhaoyuan" userId="52f0bd0a97ec5d39" providerId="LiveId" clId="{ADDC1164-58C9-45DE-A57C-9F0D2B3828DA}" dt="2021-11-13T15:36:58.072" v="2169" actId="20577"/>
+          <ac:spMkLst>
+            <pc:docMk/>
+            <pc:sldMk cId="1690221253" sldId="265"/>
+            <ac:spMk id="24" creationId="{9F5F1AE4-D2FF-40D1-8AC6-B249C382826C}"/>
+          </ac:spMkLst>
+        </pc:spChg>
+        <pc:spChg chg="add del mod">
+          <ac:chgData name="Ma Zhaoyuan" userId="52f0bd0a97ec5d39" providerId="LiveId" clId="{ADDC1164-58C9-45DE-A57C-9F0D2B3828DA}" dt="2021-11-13T15:37:30.729" v="2186" actId="20577"/>
+          <ac:spMkLst>
+            <pc:docMk/>
+            <pc:sldMk cId="1690221253" sldId="265"/>
+            <ac:spMk id="29" creationId="{FC95B77D-FC6D-4C1A-9A51-6214AEAB5AD9}"/>
+          </ac:spMkLst>
+        </pc:spChg>
+        <pc:spChg chg="add mod">
+          <ac:chgData name="Ma Zhaoyuan" userId="52f0bd0a97ec5d39" providerId="LiveId" clId="{ADDC1164-58C9-45DE-A57C-9F0D2B3828DA}" dt="2021-11-13T15:37:20.463" v="2176" actId="1076"/>
+          <ac:spMkLst>
+            <pc:docMk/>
+            <pc:sldMk cId="1690221253" sldId="265"/>
+            <ac:spMk id="30" creationId="{79B7FAE3-CEA8-415B-A7A7-64DC61286AD3}"/>
           </ac:spMkLst>
         </pc:spChg>
         <pc:spChg chg="add mod">
@@ -3532,11 +3564,43 @@
           </ac:cxnSpMkLst>
         </pc:cxnChg>
         <pc:cxnChg chg="add mod">
+          <ac:chgData name="Ma Zhaoyuan" userId="52f0bd0a97ec5d39" providerId="LiveId" clId="{ADDC1164-58C9-45DE-A57C-9F0D2B3828DA}" dt="2021-11-13T15:36:38.211" v="2139" actId="14100"/>
+          <ac:cxnSpMkLst>
+            <pc:docMk/>
+            <pc:sldMk cId="1690221253" sldId="265"/>
+            <ac:cxnSpMk id="21" creationId="{907D24C9-CA9E-4334-B43D-A6FE64431D24}"/>
+          </ac:cxnSpMkLst>
+        </pc:cxnChg>
+        <pc:cxnChg chg="add mod">
+          <ac:chgData name="Ma Zhaoyuan" userId="52f0bd0a97ec5d39" providerId="LiveId" clId="{ADDC1164-58C9-45DE-A57C-9F0D2B3828DA}" dt="2021-11-13T15:36:53.408" v="2154" actId="14100"/>
+          <ac:cxnSpMkLst>
+            <pc:docMk/>
+            <pc:sldMk cId="1690221253" sldId="265"/>
+            <ac:cxnSpMk id="25" creationId="{71DDD68D-FD59-4682-A100-09A5C8406B9B}"/>
+          </ac:cxnSpMkLst>
+        </pc:cxnChg>
+        <pc:cxnChg chg="add mod">
           <ac:chgData name="Ma Zhaoyuan" userId="52f0bd0a97ec5d39" providerId="LiveId" clId="{ADDC1164-58C9-45DE-A57C-9F0D2B3828DA}" dt="2021-11-09T02:05:24.360" v="1418" actId="1076"/>
           <ac:cxnSpMkLst>
             <pc:docMk/>
             <pc:sldMk cId="1690221253" sldId="265"/>
             <ac:cxnSpMk id="28" creationId="{9DE60767-89AB-46CC-ADD8-F11FB059CE94}"/>
+          </ac:cxnSpMkLst>
+        </pc:cxnChg>
+        <pc:cxnChg chg="add mod">
+          <ac:chgData name="Ma Zhaoyuan" userId="52f0bd0a97ec5d39" providerId="LiveId" clId="{ADDC1164-58C9-45DE-A57C-9F0D2B3828DA}" dt="2021-11-13T15:37:36.953" v="2189" actId="14100"/>
+          <ac:cxnSpMkLst>
+            <pc:docMk/>
+            <pc:sldMk cId="1690221253" sldId="265"/>
+            <ac:cxnSpMk id="31" creationId="{C5981936-FA08-4FC1-87C9-8FC109B37ABC}"/>
+          </ac:cxnSpMkLst>
+        </pc:cxnChg>
+        <pc:cxnChg chg="add mod">
+          <ac:chgData name="Ma Zhaoyuan" userId="52f0bd0a97ec5d39" providerId="LiveId" clId="{ADDC1164-58C9-45DE-A57C-9F0D2B3828DA}" dt="2021-11-13T15:37:41.059" v="2192" actId="14100"/>
+          <ac:cxnSpMkLst>
+            <pc:docMk/>
+            <pc:sldMk cId="1690221253" sldId="265"/>
+            <ac:cxnSpMk id="33" creationId="{B0169B03-5F1C-44A3-BF38-2B6089F030A0}"/>
           </ac:cxnSpMkLst>
         </pc:cxnChg>
         <pc:cxnChg chg="add mod">
@@ -7111,7 +7175,7 @@
           <a:p>
             <a:fld id="{DB45A83E-2ABB-4C31-A40E-B3E9C7C5979E}" type="datetimeFigureOut">
               <a:rPr lang="en-US" smtClean="0"/>
-              <a:t>11/10/2021</a:t>
+              <a:t>11/15/2021</a:t>
             </a:fld>
             <a:endParaRPr lang="en-US"/>
           </a:p>
@@ -7609,7 +7673,7 @@
           <a:p>
             <a:fld id="{385D109A-F3B7-4659-9388-BA4D0E165B75}" type="datetimeFigureOut">
               <a:rPr lang="en-US" smtClean="0"/>
-              <a:t>11/10/2021</a:t>
+              <a:t>11/15/2021</a:t>
             </a:fld>
             <a:endParaRPr lang="en-US"/>
           </a:p>
@@ -7807,7 +7871,7 @@
           <a:p>
             <a:fld id="{385D109A-F3B7-4659-9388-BA4D0E165B75}" type="datetimeFigureOut">
               <a:rPr lang="en-US" smtClean="0"/>
-              <a:t>11/10/2021</a:t>
+              <a:t>11/15/2021</a:t>
             </a:fld>
             <a:endParaRPr lang="en-US"/>
           </a:p>
@@ -8015,7 +8079,7 @@
           <a:p>
             <a:fld id="{385D109A-F3B7-4659-9388-BA4D0E165B75}" type="datetimeFigureOut">
               <a:rPr lang="en-US" smtClean="0"/>
-              <a:t>11/10/2021</a:t>
+              <a:t>11/15/2021</a:t>
             </a:fld>
             <a:endParaRPr lang="en-US"/>
           </a:p>
@@ -8213,7 +8277,7 @@
           <a:p>
             <a:fld id="{385D109A-F3B7-4659-9388-BA4D0E165B75}" type="datetimeFigureOut">
               <a:rPr lang="en-US" smtClean="0"/>
-              <a:t>11/10/2021</a:t>
+              <a:t>11/15/2021</a:t>
             </a:fld>
             <a:endParaRPr lang="en-US"/>
           </a:p>
@@ -8488,7 +8552,7 @@
           <a:p>
             <a:fld id="{385D109A-F3B7-4659-9388-BA4D0E165B75}" type="datetimeFigureOut">
               <a:rPr lang="en-US" smtClean="0"/>
-              <a:t>11/10/2021</a:t>
+              <a:t>11/15/2021</a:t>
             </a:fld>
             <a:endParaRPr lang="en-US"/>
           </a:p>
@@ -8753,7 +8817,7 @@
           <a:p>
             <a:fld id="{385D109A-F3B7-4659-9388-BA4D0E165B75}" type="datetimeFigureOut">
               <a:rPr lang="en-US" smtClean="0"/>
-              <a:t>11/10/2021</a:t>
+              <a:t>11/15/2021</a:t>
             </a:fld>
             <a:endParaRPr lang="en-US"/>
           </a:p>
@@ -9165,7 +9229,7 @@
           <a:p>
             <a:fld id="{385D109A-F3B7-4659-9388-BA4D0E165B75}" type="datetimeFigureOut">
               <a:rPr lang="en-US" smtClean="0"/>
-              <a:t>11/10/2021</a:t>
+              <a:t>11/15/2021</a:t>
             </a:fld>
             <a:endParaRPr lang="en-US"/>
           </a:p>
@@ -9306,7 +9370,7 @@
           <a:p>
             <a:fld id="{385D109A-F3B7-4659-9388-BA4D0E165B75}" type="datetimeFigureOut">
               <a:rPr lang="en-US" smtClean="0"/>
-              <a:t>11/10/2021</a:t>
+              <a:t>11/15/2021</a:t>
             </a:fld>
             <a:endParaRPr lang="en-US"/>
           </a:p>
@@ -9419,7 +9483,7 @@
           <a:p>
             <a:fld id="{385D109A-F3B7-4659-9388-BA4D0E165B75}" type="datetimeFigureOut">
               <a:rPr lang="en-US" smtClean="0"/>
-              <a:t>11/10/2021</a:t>
+              <a:t>11/15/2021</a:t>
             </a:fld>
             <a:endParaRPr lang="en-US"/>
           </a:p>
@@ -9730,7 +9794,7 @@
           <a:p>
             <a:fld id="{385D109A-F3B7-4659-9388-BA4D0E165B75}" type="datetimeFigureOut">
               <a:rPr lang="en-US" smtClean="0"/>
-              <a:t>11/10/2021</a:t>
+              <a:t>11/15/2021</a:t>
             </a:fld>
             <a:endParaRPr lang="en-US"/>
           </a:p>
@@ -10018,7 +10082,7 @@
           <a:p>
             <a:fld id="{385D109A-F3B7-4659-9388-BA4D0E165B75}" type="datetimeFigureOut">
               <a:rPr lang="en-US" smtClean="0"/>
-              <a:t>11/10/2021</a:t>
+              <a:t>11/15/2021</a:t>
             </a:fld>
             <a:endParaRPr lang="en-US"/>
           </a:p>
@@ -10259,7 +10323,7 @@
           <a:p>
             <a:fld id="{385D109A-F3B7-4659-9388-BA4D0E165B75}" type="datetimeFigureOut">
               <a:rPr lang="en-US" smtClean="0"/>
-              <a:t>11/10/2021</a:t>
+              <a:t>11/15/2021</a:t>
             </a:fld>
             <a:endParaRPr lang="en-US"/>
           </a:p>
@@ -11569,6 +11633,374 @@
           </a:fontRef>
         </p:style>
       </p:cxnSp>
+      <p:sp>
+        <p:nvSpPr>
+          <p:cNvPr id="20" name="Rectangle 19">
+            <a:extLst>
+              <a:ext uri="{FF2B5EF4-FFF2-40B4-BE49-F238E27FC236}">
+                <a16:creationId xmlns:a16="http://schemas.microsoft.com/office/drawing/2014/main" id="{AF099107-D8A5-420D-AA09-6D54CA1453B9}"/>
+              </a:ext>
+            </a:extLst>
+          </p:cNvPr>
+          <p:cNvSpPr/>
+          <p:nvPr/>
+        </p:nvSpPr>
+        <p:spPr>
+          <a:xfrm>
+            <a:off x="5613644" y="4520766"/>
+            <a:ext cx="1429305" cy="363985"/>
+          </a:xfrm>
+          <a:prstGeom prst="rect">
+            <a:avLst/>
+          </a:prstGeom>
+        </p:spPr>
+        <p:style>
+          <a:lnRef idx="2">
+            <a:schemeClr val="dk1"/>
+          </a:lnRef>
+          <a:fillRef idx="1">
+            <a:schemeClr val="lt1"/>
+          </a:fillRef>
+          <a:effectRef idx="0">
+            <a:schemeClr val="dk1"/>
+          </a:effectRef>
+          <a:fontRef idx="minor">
+            <a:schemeClr val="dk1"/>
+          </a:fontRef>
+        </p:style>
+        <p:txBody>
+          <a:bodyPr rtlCol="0" anchor="ctr"/>
+          <a:lstStyle/>
+          <a:p>
+            <a:pPr algn="ctr"/>
+            <a:r>
+              <a:rPr lang="en-US" dirty="0"/>
+              <a:t>…</a:t>
+            </a:r>
+          </a:p>
+        </p:txBody>
+      </p:sp>
+      <p:cxnSp>
+        <p:nvCxnSpPr>
+          <p:cNvPr id="21" name="Connector: Elbow 20">
+            <a:extLst>
+              <a:ext uri="{FF2B5EF4-FFF2-40B4-BE49-F238E27FC236}">
+                <a16:creationId xmlns:a16="http://schemas.microsoft.com/office/drawing/2014/main" id="{907D24C9-CA9E-4334-B43D-A6FE64431D24}"/>
+              </a:ext>
+            </a:extLst>
+          </p:cNvPr>
+          <p:cNvCxnSpPr>
+            <a:cxnSpLocks/>
+            <a:stCxn id="9" idx="3"/>
+            <a:endCxn id="20" idx="1"/>
+          </p:cNvCxnSpPr>
+          <p:nvPr/>
+        </p:nvCxnSpPr>
+        <p:spPr>
+          <a:xfrm>
+            <a:off x="4866442" y="2690333"/>
+            <a:ext cx="747202" cy="2012426"/>
+          </a:xfrm>
+          <a:prstGeom prst="bentConnector3">
+            <a:avLst>
+              <a:gd name="adj1" fmla="val 50000"/>
+            </a:avLst>
+          </a:prstGeom>
+          <a:ln>
+            <a:tailEnd type="triangle"/>
+          </a:ln>
+        </p:spPr>
+        <p:style>
+          <a:lnRef idx="1">
+            <a:schemeClr val="dk1"/>
+          </a:lnRef>
+          <a:fillRef idx="0">
+            <a:schemeClr val="dk1"/>
+          </a:fillRef>
+          <a:effectRef idx="0">
+            <a:schemeClr val="dk1"/>
+          </a:effectRef>
+          <a:fontRef idx="minor">
+            <a:schemeClr val="tx1"/>
+          </a:fontRef>
+        </p:style>
+      </p:cxnSp>
+      <p:sp>
+        <p:nvSpPr>
+          <p:cNvPr id="24" name="Rectangle 23">
+            <a:extLst>
+              <a:ext uri="{FF2B5EF4-FFF2-40B4-BE49-F238E27FC236}">
+                <a16:creationId xmlns:a16="http://schemas.microsoft.com/office/drawing/2014/main" id="{9F5F1AE4-D2FF-40D1-8AC6-B249C382826C}"/>
+              </a:ext>
+            </a:extLst>
+          </p:cNvPr>
+          <p:cNvSpPr/>
+          <p:nvPr/>
+        </p:nvSpPr>
+        <p:spPr>
+          <a:xfrm>
+            <a:off x="5613644" y="5195977"/>
+            <a:ext cx="1429305" cy="363985"/>
+          </a:xfrm>
+          <a:prstGeom prst="rect">
+            <a:avLst/>
+          </a:prstGeom>
+        </p:spPr>
+        <p:style>
+          <a:lnRef idx="2">
+            <a:schemeClr val="dk1"/>
+          </a:lnRef>
+          <a:fillRef idx="1">
+            <a:schemeClr val="lt1"/>
+          </a:fillRef>
+          <a:effectRef idx="0">
+            <a:schemeClr val="dk1"/>
+          </a:effectRef>
+          <a:fontRef idx="minor">
+            <a:schemeClr val="dk1"/>
+          </a:fontRef>
+        </p:style>
+        <p:txBody>
+          <a:bodyPr rtlCol="0" anchor="ctr"/>
+          <a:lstStyle/>
+          <a:p>
+            <a:pPr algn="ctr"/>
+            <a:r>
+              <a:rPr lang="en-US" dirty="0"/>
+              <a:t>section n</a:t>
+            </a:r>
+          </a:p>
+        </p:txBody>
+      </p:sp>
+      <p:cxnSp>
+        <p:nvCxnSpPr>
+          <p:cNvPr id="25" name="Connector: Elbow 24">
+            <a:extLst>
+              <a:ext uri="{FF2B5EF4-FFF2-40B4-BE49-F238E27FC236}">
+                <a16:creationId xmlns:a16="http://schemas.microsoft.com/office/drawing/2014/main" id="{71DDD68D-FD59-4682-A100-09A5C8406B9B}"/>
+              </a:ext>
+            </a:extLst>
+          </p:cNvPr>
+          <p:cNvCxnSpPr>
+            <a:cxnSpLocks/>
+            <a:stCxn id="9" idx="3"/>
+            <a:endCxn id="24" idx="1"/>
+          </p:cNvCxnSpPr>
+          <p:nvPr/>
+        </p:nvCxnSpPr>
+        <p:spPr>
+          <a:xfrm>
+            <a:off x="4866442" y="2690333"/>
+            <a:ext cx="747202" cy="2687637"/>
+          </a:xfrm>
+          <a:prstGeom prst="bentConnector3">
+            <a:avLst>
+              <a:gd name="adj1" fmla="val 50000"/>
+            </a:avLst>
+          </a:prstGeom>
+          <a:ln>
+            <a:tailEnd type="triangle"/>
+          </a:ln>
+        </p:spPr>
+        <p:style>
+          <a:lnRef idx="1">
+            <a:schemeClr val="dk1"/>
+          </a:lnRef>
+          <a:fillRef idx="0">
+            <a:schemeClr val="dk1"/>
+          </a:fillRef>
+          <a:effectRef idx="0">
+            <a:schemeClr val="dk1"/>
+          </a:effectRef>
+          <a:fontRef idx="minor">
+            <a:schemeClr val="tx1"/>
+          </a:fontRef>
+        </p:style>
+      </p:cxnSp>
+      <p:sp>
+        <p:nvSpPr>
+          <p:cNvPr id="29" name="Rectangle 28">
+            <a:extLst>
+              <a:ext uri="{FF2B5EF4-FFF2-40B4-BE49-F238E27FC236}">
+                <a16:creationId xmlns:a16="http://schemas.microsoft.com/office/drawing/2014/main" id="{FC95B77D-FC6D-4C1A-9A51-6214AEAB5AD9}"/>
+              </a:ext>
+            </a:extLst>
+          </p:cNvPr>
+          <p:cNvSpPr/>
+          <p:nvPr/>
+        </p:nvSpPr>
+        <p:spPr>
+          <a:xfrm>
+            <a:off x="3437137" y="3845555"/>
+            <a:ext cx="1429305" cy="363985"/>
+          </a:xfrm>
+          <a:prstGeom prst="rect">
+            <a:avLst/>
+          </a:prstGeom>
+        </p:spPr>
+        <p:style>
+          <a:lnRef idx="2">
+            <a:schemeClr val="dk1"/>
+          </a:lnRef>
+          <a:fillRef idx="1">
+            <a:schemeClr val="lt1"/>
+          </a:fillRef>
+          <a:effectRef idx="0">
+            <a:schemeClr val="dk1"/>
+          </a:effectRef>
+          <a:fontRef idx="minor">
+            <a:schemeClr val="dk1"/>
+          </a:fontRef>
+        </p:style>
+        <p:txBody>
+          <a:bodyPr rtlCol="0" anchor="ctr"/>
+          <a:lstStyle/>
+          <a:p>
+            <a:pPr algn="ctr"/>
+            <a:r>
+              <a:rPr lang="en-US" dirty="0"/>
+              <a:t>gripper</a:t>
+            </a:r>
+          </a:p>
+        </p:txBody>
+      </p:sp>
+      <p:sp>
+        <p:nvSpPr>
+          <p:cNvPr id="30" name="Rectangle 29">
+            <a:extLst>
+              <a:ext uri="{FF2B5EF4-FFF2-40B4-BE49-F238E27FC236}">
+                <a16:creationId xmlns:a16="http://schemas.microsoft.com/office/drawing/2014/main" id="{79B7FAE3-CEA8-415B-A7A7-64DC61286AD3}"/>
+              </a:ext>
+            </a:extLst>
+          </p:cNvPr>
+          <p:cNvSpPr/>
+          <p:nvPr/>
+        </p:nvSpPr>
+        <p:spPr>
+          <a:xfrm>
+            <a:off x="3437137" y="3151452"/>
+            <a:ext cx="1429305" cy="363985"/>
+          </a:xfrm>
+          <a:prstGeom prst="rect">
+            <a:avLst/>
+          </a:prstGeom>
+        </p:spPr>
+        <p:style>
+          <a:lnRef idx="2">
+            <a:schemeClr val="dk1"/>
+          </a:lnRef>
+          <a:fillRef idx="1">
+            <a:schemeClr val="lt1"/>
+          </a:fillRef>
+          <a:effectRef idx="0">
+            <a:schemeClr val="dk1"/>
+          </a:effectRef>
+          <a:fontRef idx="minor">
+            <a:schemeClr val="dk1"/>
+          </a:fontRef>
+        </p:style>
+        <p:txBody>
+          <a:bodyPr rtlCol="0" anchor="ctr"/>
+          <a:lstStyle/>
+          <a:p>
+            <a:pPr algn="ctr"/>
+            <a:r>
+              <a:rPr lang="en-US" dirty="0"/>
+              <a:t>rod</a:t>
+            </a:r>
+          </a:p>
+        </p:txBody>
+      </p:sp>
+      <p:cxnSp>
+        <p:nvCxnSpPr>
+          <p:cNvPr id="31" name="Connector: Elbow 30">
+            <a:extLst>
+              <a:ext uri="{FF2B5EF4-FFF2-40B4-BE49-F238E27FC236}">
+                <a16:creationId xmlns:a16="http://schemas.microsoft.com/office/drawing/2014/main" id="{C5981936-FA08-4FC1-87C9-8FC109B37ABC}"/>
+              </a:ext>
+            </a:extLst>
+          </p:cNvPr>
+          <p:cNvCxnSpPr>
+            <a:cxnSpLocks/>
+            <a:stCxn id="5" idx="3"/>
+            <a:endCxn id="30" idx="1"/>
+          </p:cNvCxnSpPr>
+          <p:nvPr/>
+        </p:nvCxnSpPr>
+        <p:spPr>
+          <a:xfrm>
+            <a:off x="2689934" y="2001914"/>
+            <a:ext cx="747203" cy="1331531"/>
+          </a:xfrm>
+          <a:prstGeom prst="bentConnector3">
+            <a:avLst>
+              <a:gd name="adj1" fmla="val 50000"/>
+            </a:avLst>
+          </a:prstGeom>
+          <a:ln>
+            <a:tailEnd type="triangle"/>
+          </a:ln>
+        </p:spPr>
+        <p:style>
+          <a:lnRef idx="1">
+            <a:schemeClr val="dk1"/>
+          </a:lnRef>
+          <a:fillRef idx="0">
+            <a:schemeClr val="dk1"/>
+          </a:fillRef>
+          <a:effectRef idx="0">
+            <a:schemeClr val="dk1"/>
+          </a:effectRef>
+          <a:fontRef idx="minor">
+            <a:schemeClr val="tx1"/>
+          </a:fontRef>
+        </p:style>
+      </p:cxnSp>
+      <p:cxnSp>
+        <p:nvCxnSpPr>
+          <p:cNvPr id="33" name="Connector: Elbow 32">
+            <a:extLst>
+              <a:ext uri="{FF2B5EF4-FFF2-40B4-BE49-F238E27FC236}">
+                <a16:creationId xmlns:a16="http://schemas.microsoft.com/office/drawing/2014/main" id="{B0169B03-5F1C-44A3-BF38-2B6089F030A0}"/>
+              </a:ext>
+            </a:extLst>
+          </p:cNvPr>
+          <p:cNvCxnSpPr>
+            <a:cxnSpLocks/>
+            <a:stCxn id="5" idx="3"/>
+            <a:endCxn id="29" idx="1"/>
+          </p:cNvCxnSpPr>
+          <p:nvPr/>
+        </p:nvCxnSpPr>
+        <p:spPr>
+          <a:xfrm>
+            <a:off x="2689934" y="2001914"/>
+            <a:ext cx="747203" cy="2025634"/>
+          </a:xfrm>
+          <a:prstGeom prst="bentConnector3">
+            <a:avLst>
+              <a:gd name="adj1" fmla="val 50000"/>
+            </a:avLst>
+          </a:prstGeom>
+          <a:ln>
+            <a:tailEnd type="triangle"/>
+          </a:ln>
+        </p:spPr>
+        <p:style>
+          <a:lnRef idx="1">
+            <a:schemeClr val="dk1"/>
+          </a:lnRef>
+          <a:fillRef idx="0">
+            <a:schemeClr val="dk1"/>
+          </a:fillRef>
+          <a:effectRef idx="0">
+            <a:schemeClr val="dk1"/>
+          </a:effectRef>
+          <a:fontRef idx="minor">
+            <a:schemeClr val="tx1"/>
+          </a:fontRef>
+        </p:style>
+      </p:cxnSp>
     </p:spTree>
     <p:extLst>
       <p:ext uri="{BB962C8B-B14F-4D97-AF65-F5344CB8AC3E}">
@@ -11667,15 +12099,15 @@
             <a:endParaRPr lang="en-US" dirty="0"/>
           </a:p>
           <a:p>
+            <a:pPr marL="0" indent="0">
+              <a:buNone/>
+            </a:pPr>
             <a:endParaRPr lang="en-US" dirty="0"/>
           </a:p>
           <a:p>
             <a:pPr marL="0" indent="0">
               <a:buNone/>
             </a:pPr>
-            <a:endParaRPr lang="en-US" dirty="0"/>
-          </a:p>
-          <a:p>
             <a:endParaRPr lang="en-US" dirty="0"/>
           </a:p>
           <a:p>
@@ -11700,682 +12132,804 @@
           </a:p>
         </p:txBody>
       </p:sp>
-      <p:graphicFrame>
-        <p:nvGraphicFramePr>
-          <p:cNvPr id="5" name="Table 4">
-            <a:extLst>
-              <a:ext uri="{FF2B5EF4-FFF2-40B4-BE49-F238E27FC236}">
-                <a16:creationId xmlns:a16="http://schemas.microsoft.com/office/drawing/2014/main" id="{50E63FBA-2BE9-43DC-B2A7-F1DD0BE06597}"/>
-              </a:ext>
-            </a:extLst>
-          </p:cNvPr>
-          <p:cNvGraphicFramePr>
-            <a:graphicFrameLocks noGrp="1"/>
-          </p:cNvGraphicFramePr>
-          <p:nvPr>
-            <p:extLst>
-              <p:ext uri="{D42A27DB-BD31-4B8C-83A1-F6EECF244321}">
-                <p14:modId xmlns:p14="http://schemas.microsoft.com/office/powerpoint/2010/main" val="775465298"/>
-              </p:ext>
-            </p:extLst>
-          </p:nvPr>
-        </p:nvGraphicFramePr>
-        <p:xfrm>
-          <a:off x="1207363" y="1953868"/>
-          <a:ext cx="9641145" cy="2225040"/>
-        </p:xfrm>
-        <a:graphic>
-          <a:graphicData uri="http://schemas.openxmlformats.org/drawingml/2006/table">
-            <a:tbl>
-              <a:tblPr firstRow="1" bandRow="1">
-                <a:tableStyleId>{5C22544A-7EE6-4342-B048-85BDC9FD1C3A}</a:tableStyleId>
-              </a:tblPr>
-              <a:tblGrid>
-                <a:gridCol w="1049644">
-                  <a:extLst>
-                    <a:ext uri="{9D8B030D-6E8A-4147-A177-3AD203B41FA5}">
-                      <a16:colId xmlns:a16="http://schemas.microsoft.com/office/drawing/2014/main" val="3852810974"/>
-                    </a:ext>
-                  </a:extLst>
-                </a:gridCol>
-                <a:gridCol w="1712827">
-                  <a:extLst>
-                    <a:ext uri="{9D8B030D-6E8A-4147-A177-3AD203B41FA5}">
-                      <a16:colId xmlns:a16="http://schemas.microsoft.com/office/drawing/2014/main" val="505222439"/>
-                    </a:ext>
-                  </a:extLst>
-                </a:gridCol>
-                <a:gridCol w="1503185">
-                  <a:extLst>
-                    <a:ext uri="{9D8B030D-6E8A-4147-A177-3AD203B41FA5}">
-                      <a16:colId xmlns:a16="http://schemas.microsoft.com/office/drawing/2014/main" val="1788938975"/>
-                    </a:ext>
-                  </a:extLst>
-                </a:gridCol>
-                <a:gridCol w="1436277">
-                  <a:extLst>
-                    <a:ext uri="{9D8B030D-6E8A-4147-A177-3AD203B41FA5}">
-                      <a16:colId xmlns:a16="http://schemas.microsoft.com/office/drawing/2014/main" val="1976107575"/>
-                    </a:ext>
-                  </a:extLst>
-                </a:gridCol>
-                <a:gridCol w="1721748">
-                  <a:extLst>
-                    <a:ext uri="{9D8B030D-6E8A-4147-A177-3AD203B41FA5}">
-                      <a16:colId xmlns:a16="http://schemas.microsoft.com/office/drawing/2014/main" val="1464474423"/>
-                    </a:ext>
-                  </a:extLst>
-                </a:gridCol>
-                <a:gridCol w="2217464">
-                  <a:extLst>
-                    <a:ext uri="{9D8B030D-6E8A-4147-A177-3AD203B41FA5}">
-                      <a16:colId xmlns:a16="http://schemas.microsoft.com/office/drawing/2014/main" val="444248507"/>
-                    </a:ext>
-                  </a:extLst>
-                </a:gridCol>
-              </a:tblGrid>
-              <a:tr h="370840">
-                <a:tc>
-                  <a:txBody>
-                    <a:bodyPr/>
-                    <a:lstStyle/>
-                    <a:p>
-                      <a:endParaRPr lang="en-US" dirty="0"/>
-                    </a:p>
-                  </a:txBody>
-                  <a:tcPr/>
-                </a:tc>
-                <a:tc>
-                  <a:txBody>
-                    <a:bodyPr/>
-                    <a:lstStyle/>
-                    <a:p>
-                      <a:r>
-                        <a:rPr lang="en-US" dirty="0"/>
-                        <a:t>-1</a:t>
-                      </a:r>
-                    </a:p>
-                  </a:txBody>
-                  <a:tcPr/>
-                </a:tc>
-                <a:tc>
-                  <a:txBody>
-                    <a:bodyPr/>
-                    <a:lstStyle/>
-                    <a:p>
-                      <a:r>
-                        <a:rPr lang="en-US" dirty="0"/>
-                        <a:t>0 (int)</a:t>
-                      </a:r>
-                    </a:p>
-                  </a:txBody>
-                  <a:tcPr/>
-                </a:tc>
-                <a:tc>
-                  <a:txBody>
-                    <a:bodyPr/>
-                    <a:lstStyle/>
-                    <a:p>
-                      <a:r>
-                        <a:rPr lang="en-US" dirty="0"/>
-                        <a:t>1 (int)</a:t>
-                      </a:r>
-                    </a:p>
-                  </a:txBody>
-                  <a:tcPr/>
-                </a:tc>
-                <a:tc>
-                  <a:txBody>
-                    <a:bodyPr/>
-                    <a:lstStyle/>
-                    <a:p>
-                      <a:r>
-                        <a:rPr lang="en-US" dirty="0"/>
-                        <a:t>2(int)</a:t>
-                      </a:r>
-                    </a:p>
-                  </a:txBody>
-                  <a:tcPr/>
-                </a:tc>
-                <a:tc>
-                  <a:txBody>
-                    <a:bodyPr/>
-                    <a:lstStyle/>
-                    <a:p>
-                      <a:r>
-                        <a:rPr lang="en-US" dirty="0"/>
-                        <a:t>float</a:t>
-                      </a:r>
-                    </a:p>
-                  </a:txBody>
-                  <a:tcPr/>
-                </a:tc>
+      <mc:AlternateContent xmlns:mc="http://schemas.openxmlformats.org/markup-compatibility/2006">
+        <mc:Choice xmlns:a14="http://schemas.microsoft.com/office/drawing/2010/main" Requires="a14">
+          <p:graphicFrame>
+            <p:nvGraphicFramePr>
+              <p:cNvPr id="5" name="Table 4">
                 <a:extLst>
-                  <a:ext uri="{0D108BD9-81ED-4DB2-BD59-A6C34878D82A}">
-                    <a16:rowId xmlns:a16="http://schemas.microsoft.com/office/drawing/2014/main" val="3682451536"/>
+                  <a:ext uri="{FF2B5EF4-FFF2-40B4-BE49-F238E27FC236}">
+                    <a16:creationId xmlns:a16="http://schemas.microsoft.com/office/drawing/2014/main" id="{50E63FBA-2BE9-43DC-B2A7-F1DD0BE06597}"/>
                   </a:ext>
                 </a:extLst>
-              </a:tr>
-              <a:tr h="370840">
-                <a:tc>
-                  <a:txBody>
-                    <a:bodyPr/>
-                    <a:lstStyle/>
-                    <a:p>
-                      <a:r>
-                        <a:rPr lang="en-US" dirty="0"/>
-                        <a:t>action[0]</a:t>
-                      </a:r>
-                    </a:p>
-                  </a:txBody>
-                  <a:tcPr/>
-                </a:tc>
-                <a:tc>
-                  <a:txBody>
-                    <a:bodyPr/>
-                    <a:lstStyle/>
-                    <a:p>
-                      <a:r>
-                        <a:rPr lang="en-US" dirty="0"/>
-                        <a:t>move left</a:t>
-                      </a:r>
-                    </a:p>
-                  </a:txBody>
-                  <a:tcPr/>
-                </a:tc>
-                <a:tc>
-                  <a:txBody>
-                    <a:bodyPr/>
-                    <a:lstStyle/>
-                    <a:p>
-                      <a:r>
-                        <a:rPr lang="en-US" dirty="0"/>
-                        <a:t>do nothing</a:t>
-                      </a:r>
-                    </a:p>
-                  </a:txBody>
-                  <a:tcPr/>
-                </a:tc>
-                <a:tc>
-                  <a:txBody>
-                    <a:bodyPr/>
-                    <a:lstStyle/>
-                    <a:p>
-                      <a:r>
-                        <a:rPr lang="en-US" dirty="0"/>
-                        <a:t>move right</a:t>
-                      </a:r>
-                    </a:p>
-                  </a:txBody>
-                  <a:tcPr/>
-                </a:tc>
-                <a:tc>
-                  <a:txBody>
-                    <a:bodyPr/>
-                    <a:lstStyle/>
-                    <a:p>
-                      <a:endParaRPr lang="en-US" dirty="0"/>
-                    </a:p>
-                  </a:txBody>
-                  <a:tcPr/>
-                </a:tc>
-                <a:tc>
-                  <a:txBody>
-                    <a:bodyPr/>
-                    <a:lstStyle/>
-                    <a:p>
-                      <a:r>
-                        <a:rPr lang="en-US" dirty="0"/>
-                        <a:t>N/A</a:t>
-                      </a:r>
-                    </a:p>
-                  </a:txBody>
-                  <a:tcPr/>
-                </a:tc>
+              </p:cNvPr>
+              <p:cNvGraphicFramePr>
+                <a:graphicFrameLocks noGrp="1"/>
+              </p:cNvGraphicFramePr>
+              <p:nvPr>
+                <p:extLst>
+                  <p:ext uri="{D42A27DB-BD31-4B8C-83A1-F6EECF244321}">
+                    <p14:modId xmlns:p14="http://schemas.microsoft.com/office/powerpoint/2010/main" val="2493016741"/>
+                  </p:ext>
+                </p:extLst>
+              </p:nvPr>
+            </p:nvGraphicFramePr>
+            <p:xfrm>
+              <a:off x="1207362" y="1953868"/>
+              <a:ext cx="10146438" cy="1752600"/>
+            </p:xfrm>
+            <a:graphic>
+              <a:graphicData uri="http://schemas.openxmlformats.org/drawingml/2006/table">
+                <a:tbl>
+                  <a:tblPr firstRow="1" bandRow="1">
+                    <a:tableStyleId>{5C22544A-7EE6-4342-B048-85BDC9FD1C3A}</a:tableStyleId>
+                  </a:tblPr>
+                  <a:tblGrid>
+                    <a:gridCol w="1873189">
+                      <a:extLst>
+                        <a:ext uri="{9D8B030D-6E8A-4147-A177-3AD203B41FA5}">
+                          <a16:colId xmlns:a16="http://schemas.microsoft.com/office/drawing/2014/main" val="3852810974"/>
+                        </a:ext>
+                      </a:extLst>
+                    </a:gridCol>
+                    <a:gridCol w="1961966">
+                      <a:extLst>
+                        <a:ext uri="{9D8B030D-6E8A-4147-A177-3AD203B41FA5}">
+                          <a16:colId xmlns:a16="http://schemas.microsoft.com/office/drawing/2014/main" val="505222439"/>
+                        </a:ext>
+                      </a:extLst>
+                    </a:gridCol>
+                    <a:gridCol w="1642368">
+                      <a:extLst>
+                        <a:ext uri="{9D8B030D-6E8A-4147-A177-3AD203B41FA5}">
+                          <a16:colId xmlns:a16="http://schemas.microsoft.com/office/drawing/2014/main" val="1788938975"/>
+                        </a:ext>
+                      </a:extLst>
+                    </a:gridCol>
+                    <a:gridCol w="2272684">
+                      <a:extLst>
+                        <a:ext uri="{9D8B030D-6E8A-4147-A177-3AD203B41FA5}">
+                          <a16:colId xmlns:a16="http://schemas.microsoft.com/office/drawing/2014/main" val="1976107575"/>
+                        </a:ext>
+                      </a:extLst>
+                    </a:gridCol>
+                    <a:gridCol w="2396231">
+                      <a:extLst>
+                        <a:ext uri="{9D8B030D-6E8A-4147-A177-3AD203B41FA5}">
+                          <a16:colId xmlns:a16="http://schemas.microsoft.com/office/drawing/2014/main" val="1464474423"/>
+                        </a:ext>
+                      </a:extLst>
+                    </a:gridCol>
+                  </a:tblGrid>
+                  <a:tr h="370840">
+                    <a:tc>
+                      <a:txBody>
+                        <a:bodyPr/>
+                        <a:lstStyle/>
+                        <a:p>
+                          <a:endParaRPr lang="en-US" dirty="0"/>
+                        </a:p>
+                      </a:txBody>
+                      <a:tcPr/>
+                    </a:tc>
+                    <a:tc>
+                      <a:txBody>
+                        <a:bodyPr/>
+                        <a:lstStyle/>
+                        <a:p>
+                          <a:r>
+                            <a:rPr lang="en-US" dirty="0"/>
+                            <a:t>possible data</a:t>
+                          </a:r>
+                        </a:p>
+                      </a:txBody>
+                      <a:tcPr/>
+                    </a:tc>
+                    <a:tc>
+                      <a:txBody>
+                        <a:bodyPr/>
+                        <a:lstStyle/>
+                        <a:p>
+                          <a:endParaRPr lang="en-US" dirty="0"/>
+                        </a:p>
+                      </a:txBody>
+                      <a:tcPr/>
+                    </a:tc>
+                    <a:tc>
+                      <a:txBody>
+                        <a:bodyPr/>
+                        <a:lstStyle/>
+                        <a:p>
+                          <a:endParaRPr lang="en-US" dirty="0"/>
+                        </a:p>
+                      </a:txBody>
+                      <a:tcPr/>
+                    </a:tc>
+                    <a:tc>
+                      <a:txBody>
+                        <a:bodyPr/>
+                        <a:lstStyle/>
+                        <a:p>
+                          <a:endParaRPr lang="en-US" dirty="0"/>
+                        </a:p>
+                      </a:txBody>
+                      <a:tcPr/>
+                    </a:tc>
+                    <a:extLst>
+                      <a:ext uri="{0D108BD9-81ED-4DB2-BD59-A6C34878D82A}">
+                        <a16:rowId xmlns:a16="http://schemas.microsoft.com/office/drawing/2014/main" val="3682451536"/>
+                      </a:ext>
+                    </a:extLst>
+                  </a:tr>
+                  <a:tr h="370840">
+                    <a:tc>
+                      <a:txBody>
+                        <a:bodyPr/>
+                        <a:lstStyle/>
+                        <a:p>
+                          <a:r>
+                            <a:rPr lang="en-US" dirty="0"/>
+                            <a:t>action[0]: [</a:t>
+                          </a:r>
+                          <a14:m>
+                            <m:oMath xmlns:m="http://schemas.openxmlformats.org/officeDocument/2006/math">
+                              <m:r>
+                                <m:rPr>
+                                  <m:sty m:val="p"/>
+                                </m:rPr>
+                                <a:rPr lang="en-US" b="0" i="0" smtClean="0">
+                                  <a:latin typeface="Cambria Math" panose="02040503050406030204" pitchFamily="18" charset="0"/>
+                                </a:rPr>
+                                <m:t>Δ</m:t>
+                              </m:r>
+                            </m:oMath>
+                          </a14:m>
+                          <a:r>
+                            <a:rPr lang="en-US" dirty="0"/>
+                            <a:t>x, </a:t>
+                          </a:r>
+                          <a14:m>
+                            <m:oMath xmlns:m="http://schemas.openxmlformats.org/officeDocument/2006/math">
+                              <m:r>
+                                <m:rPr>
+                                  <m:sty m:val="p"/>
+                                </m:rPr>
+                                <a:rPr lang="en-US" b="0" i="0" smtClean="0">
+                                  <a:latin typeface="Cambria Math" panose="02040503050406030204" pitchFamily="18" charset="0"/>
+                                </a:rPr>
+                                <m:t>Δ</m:t>
+                              </m:r>
+                            </m:oMath>
+                          </a14:m>
+                          <a:r>
+                            <a:rPr lang="en-US" dirty="0"/>
+                            <a:t>y]</a:t>
+                          </a:r>
+                        </a:p>
+                      </a:txBody>
+                      <a:tcPr/>
+                    </a:tc>
+                    <a:tc>
+                      <a:txBody>
+                        <a:bodyPr/>
+                        <a:lstStyle/>
+                        <a:p>
+                          <a14:m>
+                            <m:oMath xmlns:m="http://schemas.openxmlformats.org/officeDocument/2006/math">
+                              <m:r>
+                                <m:rPr>
+                                  <m:sty m:val="p"/>
+                                </m:rPr>
+                                <a:rPr lang="en-US" b="0" i="0" smtClean="0">
+                                  <a:latin typeface="Cambria Math" panose="02040503050406030204" pitchFamily="18" charset="0"/>
+                                </a:rPr>
+                                <m:t>Δ</m:t>
+                              </m:r>
+                            </m:oMath>
+                          </a14:m>
+                          <a:r>
+                            <a:rPr lang="en-US" dirty="0"/>
+                            <a:t>x&lt;0: move left</a:t>
+                          </a:r>
+                        </a:p>
+                        <a:p>
+                          <a14:m>
+                            <m:oMath xmlns:m="http://schemas.openxmlformats.org/officeDocument/2006/math">
+                              <m:r>
+                                <m:rPr>
+                                  <m:sty m:val="p"/>
+                                </m:rPr>
+                                <a:rPr lang="en-US" b="0" i="0" smtClean="0">
+                                  <a:latin typeface="Cambria Math" panose="02040503050406030204" pitchFamily="18" charset="0"/>
+                                </a:rPr>
+                                <m:t>Δ</m:t>
+                              </m:r>
+                            </m:oMath>
+                          </a14:m>
+                          <a:r>
+                            <a:rPr lang="en-US" dirty="0"/>
+                            <a:t>y&lt;0: move down</a:t>
+                          </a:r>
+                        </a:p>
+                      </a:txBody>
+                      <a:tcPr/>
+                    </a:tc>
+                    <a:tc>
+                      <a:txBody>
+                        <a:bodyPr/>
+                        <a:lstStyle/>
+                        <a:p>
+                          <a:r>
+                            <a:rPr lang="en-US" dirty="0"/>
+                            <a:t>0: do nothing</a:t>
+                          </a:r>
+                        </a:p>
+                      </a:txBody>
+                      <a:tcPr/>
+                    </a:tc>
+                    <a:tc>
+                      <a:txBody>
+                        <a:bodyPr/>
+                        <a:lstStyle/>
+                        <a:p>
+                          <a14:m>
+                            <m:oMath xmlns:m="http://schemas.openxmlformats.org/officeDocument/2006/math">
+                              <m:r>
+                                <m:rPr>
+                                  <m:sty m:val="p"/>
+                                </m:rPr>
+                                <a:rPr lang="en-US" b="0" i="0" smtClean="0">
+                                  <a:latin typeface="Cambria Math" panose="02040503050406030204" pitchFamily="18" charset="0"/>
+                                </a:rPr>
+                                <m:t>Δ</m:t>
+                              </m:r>
+                            </m:oMath>
+                          </a14:m>
+                          <a:r>
+                            <a:rPr lang="en-US" dirty="0"/>
+                            <a:t>x: move right</a:t>
+                          </a:r>
+                        </a:p>
+                        <a:p>
+                          <a14:m>
+                            <m:oMath xmlns:m="http://schemas.openxmlformats.org/officeDocument/2006/math">
+                              <m:r>
+                                <m:rPr>
+                                  <m:sty m:val="p"/>
+                                </m:rPr>
+                                <a:rPr lang="en-US" b="0" i="0" smtClean="0">
+                                  <a:latin typeface="Cambria Math" panose="02040503050406030204" pitchFamily="18" charset="0"/>
+                                </a:rPr>
+                                <m:t>Δ</m:t>
+                              </m:r>
+                            </m:oMath>
+                          </a14:m>
+                          <a:r>
+                            <a:rPr lang="en-US" dirty="0"/>
+                            <a:t>y: move up</a:t>
+                          </a:r>
+                        </a:p>
+                      </a:txBody>
+                      <a:tcPr/>
+                    </a:tc>
+                    <a:tc>
+                      <a:txBody>
+                        <a:bodyPr/>
+                        <a:lstStyle/>
+                        <a:p>
+                          <a:endParaRPr lang="en-US" dirty="0"/>
+                        </a:p>
+                      </a:txBody>
+                      <a:tcPr/>
+                    </a:tc>
+                    <a:extLst>
+                      <a:ext uri="{0D108BD9-81ED-4DB2-BD59-A6C34878D82A}">
+                        <a16:rowId xmlns:a16="http://schemas.microsoft.com/office/drawing/2014/main" val="2045625300"/>
+                      </a:ext>
+                    </a:extLst>
+                  </a:tr>
+                  <a:tr h="370840">
+                    <a:tc>
+                      <a:txBody>
+                        <a:bodyPr/>
+                        <a:lstStyle/>
+                        <a:p>
+                          <a:r>
+                            <a:rPr lang="en-US" dirty="0"/>
+                            <a:t>action[1]</a:t>
+                          </a:r>
+                        </a:p>
+                      </a:txBody>
+                      <a:tcPr/>
+                    </a:tc>
+                    <a:tc>
+                      <a:txBody>
+                        <a:bodyPr/>
+                        <a:lstStyle/>
+                        <a:p>
+                          <a:r>
+                            <a:rPr lang="en-US" dirty="0"/>
+                            <a:t>-1: gripper release</a:t>
+                          </a:r>
+                        </a:p>
+                      </a:txBody>
+                      <a:tcPr/>
+                    </a:tc>
+                    <a:tc>
+                      <a:txBody>
+                        <a:bodyPr/>
+                        <a:lstStyle/>
+                        <a:p>
+                          <a:r>
+                            <a:rPr lang="en-US" dirty="0"/>
+                            <a:t>0: do nothing</a:t>
+                          </a:r>
+                        </a:p>
+                      </a:txBody>
+                      <a:tcPr/>
+                    </a:tc>
+                    <a:tc>
+                      <a:txBody>
+                        <a:bodyPr/>
+                        <a:lstStyle/>
+                        <a:p>
+                          <a:r>
+                            <a:rPr lang="en-US" dirty="0"/>
+                            <a:t>1: gripper grab</a:t>
+                          </a:r>
+                        </a:p>
+                      </a:txBody>
+                      <a:tcPr/>
+                    </a:tc>
+                    <a:tc>
+                      <a:txBody>
+                        <a:bodyPr/>
+                        <a:lstStyle/>
+                        <a:p>
+                          <a:r>
+                            <a:rPr lang="en-US" dirty="0"/>
+                            <a:t>2: extend sections</a:t>
+                          </a:r>
+                        </a:p>
+                      </a:txBody>
+                      <a:tcPr/>
+                    </a:tc>
+                    <a:extLst>
+                      <a:ext uri="{0D108BD9-81ED-4DB2-BD59-A6C34878D82A}">
+                        <a16:rowId xmlns:a16="http://schemas.microsoft.com/office/drawing/2014/main" val="2467114946"/>
+                      </a:ext>
+                    </a:extLst>
+                  </a:tr>
+                  <a:tr h="370840">
+                    <a:tc>
+                      <a:txBody>
+                        <a:bodyPr/>
+                        <a:lstStyle/>
+                        <a:p>
+                          <a:r>
+                            <a:rPr lang="en-US" dirty="0"/>
+                            <a:t>action[2]</a:t>
+                          </a:r>
+                        </a:p>
+                      </a:txBody>
+                      <a:tcPr/>
+                    </a:tc>
+                    <a:tc gridSpan="2">
+                      <a:txBody>
+                        <a:bodyPr/>
+                        <a:lstStyle/>
+                        <a:p>
+                          <a:r>
+                            <a:rPr lang="en-US" dirty="0"/>
+                            <a:t>[list]: position [x, y] of way points</a:t>
+                          </a:r>
+                        </a:p>
+                      </a:txBody>
+                      <a:tcPr/>
+                    </a:tc>
+                    <a:tc hMerge="1">
+                      <a:txBody>
+                        <a:bodyPr/>
+                        <a:lstStyle/>
+                        <a:p>
+                          <a:endParaRPr lang="en-US" dirty="0"/>
+                        </a:p>
+                      </a:txBody>
+                      <a:tcPr/>
+                    </a:tc>
+                    <a:tc>
+                      <a:txBody>
+                        <a:bodyPr/>
+                        <a:lstStyle/>
+                        <a:p>
+                          <a:r>
+                            <a:rPr lang="en-US" dirty="0"/>
+                            <a:t>-1: clear up waypoints</a:t>
+                          </a:r>
+                        </a:p>
+                      </a:txBody>
+                      <a:tcPr/>
+                    </a:tc>
+                    <a:tc>
+                      <a:txBody>
+                        <a:bodyPr/>
+                        <a:lstStyle/>
+                        <a:p>
+                          <a:r>
+                            <a:rPr lang="en-US" dirty="0"/>
+                            <a:t>0 or others: do nothing</a:t>
+                          </a:r>
+                        </a:p>
+                      </a:txBody>
+                      <a:tcPr/>
+                    </a:tc>
+                    <a:extLst>
+                      <a:ext uri="{0D108BD9-81ED-4DB2-BD59-A6C34878D82A}">
+                        <a16:rowId xmlns:a16="http://schemas.microsoft.com/office/drawing/2014/main" val="1273251932"/>
+                      </a:ext>
+                    </a:extLst>
+                  </a:tr>
+                </a:tbl>
+              </a:graphicData>
+            </a:graphic>
+          </p:graphicFrame>
+        </mc:Choice>
+        <mc:Fallback>
+          <p:graphicFrame>
+            <p:nvGraphicFramePr>
+              <p:cNvPr id="5" name="Table 4">
                 <a:extLst>
-                  <a:ext uri="{0D108BD9-81ED-4DB2-BD59-A6C34878D82A}">
-                    <a16:rowId xmlns:a16="http://schemas.microsoft.com/office/drawing/2014/main" val="2045625300"/>
+                  <a:ext uri="{FF2B5EF4-FFF2-40B4-BE49-F238E27FC236}">
+                    <a16:creationId xmlns:a16="http://schemas.microsoft.com/office/drawing/2014/main" id="{50E63FBA-2BE9-43DC-B2A7-F1DD0BE06597}"/>
                   </a:ext>
                 </a:extLst>
-              </a:tr>
-              <a:tr h="370840">
-                <a:tc>
-                  <a:txBody>
-                    <a:bodyPr/>
-                    <a:lstStyle/>
-                    <a:p>
-                      <a:r>
-                        <a:rPr lang="en-US" dirty="0"/>
-                        <a:t>action[1]</a:t>
-                      </a:r>
-                    </a:p>
-                  </a:txBody>
-                  <a:tcPr/>
-                </a:tc>
-                <a:tc>
-                  <a:txBody>
-                    <a:bodyPr/>
-                    <a:lstStyle/>
-                    <a:p>
-                      <a:r>
-                        <a:rPr lang="en-US" dirty="0"/>
-                        <a:t>move down</a:t>
-                      </a:r>
-                    </a:p>
-                  </a:txBody>
-                  <a:tcPr/>
-                </a:tc>
-                <a:tc>
-                  <a:txBody>
-                    <a:bodyPr/>
-                    <a:lstStyle/>
-                    <a:p>
-                      <a:r>
-                        <a:rPr lang="en-US" dirty="0"/>
-                        <a:t>do nothing</a:t>
-                      </a:r>
-                    </a:p>
-                  </a:txBody>
-                  <a:tcPr/>
-                </a:tc>
-                <a:tc>
-                  <a:txBody>
-                    <a:bodyPr/>
-                    <a:lstStyle/>
-                    <a:p>
-                      <a:pPr marL="0" marR="0" lvl="0" indent="0" algn="l" defTabSz="914400" rtl="0" eaLnBrk="1" fontAlgn="auto" latinLnBrk="0" hangingPunct="1">
-                        <a:lnSpc>
-                          <a:spcPct val="100000"/>
-                        </a:lnSpc>
-                        <a:spcBef>
-                          <a:spcPts val="0"/>
-                        </a:spcBef>
-                        <a:spcAft>
-                          <a:spcPts val="0"/>
-                        </a:spcAft>
-                        <a:buClrTx/>
-                        <a:buSzTx/>
-                        <a:buFontTx/>
-                        <a:buNone/>
-                        <a:tabLst/>
-                        <a:defRPr/>
-                      </a:pPr>
-                      <a:r>
-                        <a:rPr lang="en-US" dirty="0"/>
-                        <a:t>move up</a:t>
-                      </a:r>
-                    </a:p>
-                  </a:txBody>
-                  <a:tcPr/>
-                </a:tc>
-                <a:tc>
-                  <a:txBody>
-                    <a:bodyPr/>
-                    <a:lstStyle/>
-                    <a:p>
-                      <a:pPr marL="0" marR="0" lvl="0" indent="0" algn="l" defTabSz="914400" rtl="0" eaLnBrk="1" fontAlgn="auto" latinLnBrk="0" hangingPunct="1">
-                        <a:lnSpc>
-                          <a:spcPct val="100000"/>
-                        </a:lnSpc>
-                        <a:spcBef>
-                          <a:spcPts val="0"/>
-                        </a:spcBef>
-                        <a:spcAft>
-                          <a:spcPts val="0"/>
-                        </a:spcAft>
-                        <a:buClrTx/>
-                        <a:buSzTx/>
-                        <a:buFontTx/>
-                        <a:buNone/>
-                        <a:tabLst/>
-                        <a:defRPr/>
-                      </a:pPr>
-                      <a:endParaRPr lang="en-US" dirty="0"/>
-                    </a:p>
-                  </a:txBody>
-                  <a:tcPr/>
-                </a:tc>
-                <a:tc>
-                  <a:txBody>
-                    <a:bodyPr/>
-                    <a:lstStyle/>
-                    <a:p>
-                      <a:pPr marL="0" marR="0" lvl="0" indent="0" algn="l" defTabSz="914400" rtl="0" eaLnBrk="1" fontAlgn="auto" latinLnBrk="0" hangingPunct="1">
-                        <a:lnSpc>
-                          <a:spcPct val="100000"/>
-                        </a:lnSpc>
-                        <a:spcBef>
-                          <a:spcPts val="0"/>
-                        </a:spcBef>
-                        <a:spcAft>
-                          <a:spcPts val="0"/>
-                        </a:spcAft>
-                        <a:buClrTx/>
-                        <a:buSzTx/>
-                        <a:buFontTx/>
-                        <a:buNone/>
-                        <a:tabLst/>
-                        <a:defRPr/>
-                      </a:pPr>
-                      <a:r>
-                        <a:rPr lang="en-US" dirty="0"/>
-                        <a:t>N/A</a:t>
-                      </a:r>
-                    </a:p>
-                  </a:txBody>
-                  <a:tcPr/>
-                </a:tc>
-                <a:extLst>
-                  <a:ext uri="{0D108BD9-81ED-4DB2-BD59-A6C34878D82A}">
-                    <a16:rowId xmlns:a16="http://schemas.microsoft.com/office/drawing/2014/main" val="3584702652"/>
-                  </a:ext>
-                </a:extLst>
-              </a:tr>
-              <a:tr h="370840">
-                <a:tc>
-                  <a:txBody>
-                    <a:bodyPr/>
-                    <a:lstStyle/>
-                    <a:p>
-                      <a:r>
-                        <a:rPr lang="en-US" dirty="0"/>
-                        <a:t>action[2]</a:t>
-                      </a:r>
-                    </a:p>
-                  </a:txBody>
-                  <a:tcPr/>
-                </a:tc>
-                <a:tc>
-                  <a:txBody>
-                    <a:bodyPr/>
-                    <a:lstStyle/>
-                    <a:p>
-                      <a:r>
-                        <a:rPr lang="en-US" dirty="0"/>
-                        <a:t>gripper release</a:t>
-                      </a:r>
-                    </a:p>
-                  </a:txBody>
-                  <a:tcPr/>
-                </a:tc>
-                <a:tc>
-                  <a:txBody>
-                    <a:bodyPr/>
-                    <a:lstStyle/>
-                    <a:p>
-                      <a:r>
-                        <a:rPr lang="en-US" dirty="0"/>
-                        <a:t>do nothing</a:t>
-                      </a:r>
-                    </a:p>
-                  </a:txBody>
-                  <a:tcPr/>
-                </a:tc>
-                <a:tc>
-                  <a:txBody>
-                    <a:bodyPr/>
-                    <a:lstStyle/>
-                    <a:p>
-                      <a:r>
-                        <a:rPr lang="en-US" dirty="0"/>
-                        <a:t>gripper grab</a:t>
-                      </a:r>
-                    </a:p>
-                  </a:txBody>
-                  <a:tcPr/>
-                </a:tc>
-                <a:tc>
-                  <a:txBody>
-                    <a:bodyPr/>
-                    <a:lstStyle/>
-                    <a:p>
-                      <a:r>
-                        <a:rPr lang="en-US"/>
-                        <a:t>extend sections</a:t>
-                      </a:r>
-                      <a:endParaRPr lang="en-US" dirty="0"/>
-                    </a:p>
-                  </a:txBody>
-                  <a:tcPr/>
-                </a:tc>
-                <a:tc>
-                  <a:txBody>
-                    <a:bodyPr/>
-                    <a:lstStyle/>
-                    <a:p>
-                      <a:r>
-                        <a:rPr lang="en-US" dirty="0"/>
-                        <a:t>N/A</a:t>
-                      </a:r>
-                    </a:p>
-                  </a:txBody>
-                  <a:tcPr/>
-                </a:tc>
-                <a:extLst>
-                  <a:ext uri="{0D108BD9-81ED-4DB2-BD59-A6C34878D82A}">
-                    <a16:rowId xmlns:a16="http://schemas.microsoft.com/office/drawing/2014/main" val="2467114946"/>
-                  </a:ext>
-                </a:extLst>
-              </a:tr>
-              <a:tr h="370840">
-                <a:tc>
-                  <a:txBody>
-                    <a:bodyPr/>
-                    <a:lstStyle/>
-                    <a:p>
-                      <a:r>
-                        <a:rPr lang="en-US" dirty="0"/>
-                        <a:t>action[3]</a:t>
-                      </a:r>
-                    </a:p>
-                  </a:txBody>
-                  <a:tcPr/>
-                </a:tc>
-                <a:tc>
-                  <a:txBody>
-                    <a:bodyPr/>
-                    <a:lstStyle/>
-                    <a:p>
-                      <a:r>
-                        <a:rPr lang="en-US" dirty="0"/>
-                        <a:t>do nothing</a:t>
-                      </a:r>
-                    </a:p>
-                  </a:txBody>
-                  <a:tcPr/>
-                </a:tc>
-                <a:tc>
-                  <a:txBody>
-                    <a:bodyPr/>
-                    <a:lstStyle/>
-                    <a:p>
-                      <a:r>
-                        <a:rPr lang="en-US" dirty="0"/>
-                        <a:t>N/A</a:t>
-                      </a:r>
-                    </a:p>
-                  </a:txBody>
-                  <a:tcPr/>
-                </a:tc>
-                <a:tc>
-                  <a:txBody>
-                    <a:bodyPr/>
-                    <a:lstStyle/>
-                    <a:p>
-                      <a:r>
-                        <a:rPr lang="en-US" dirty="0"/>
-                        <a:t>N/A</a:t>
-                      </a:r>
-                    </a:p>
-                  </a:txBody>
-                  <a:tcPr/>
-                </a:tc>
-                <a:tc>
-                  <a:txBody>
-                    <a:bodyPr/>
-                    <a:lstStyle/>
-                    <a:p>
-                      <a:endParaRPr lang="en-US" dirty="0"/>
-                    </a:p>
-                  </a:txBody>
-                  <a:tcPr/>
-                </a:tc>
-                <a:tc>
-                  <a:txBody>
-                    <a:bodyPr/>
-                    <a:lstStyle/>
-                    <a:p>
-                      <a:r>
-                        <a:rPr lang="en-US" dirty="0"/>
-                        <a:t>mouse x position</a:t>
-                      </a:r>
-                    </a:p>
-                  </a:txBody>
-                  <a:tcPr/>
-                </a:tc>
-                <a:extLst>
-                  <a:ext uri="{0D108BD9-81ED-4DB2-BD59-A6C34878D82A}">
-                    <a16:rowId xmlns:a16="http://schemas.microsoft.com/office/drawing/2014/main" val="3108182828"/>
-                  </a:ext>
-                </a:extLst>
-              </a:tr>
-              <a:tr h="370840">
-                <a:tc>
-                  <a:txBody>
-                    <a:bodyPr/>
-                    <a:lstStyle/>
-                    <a:p>
-                      <a:r>
-                        <a:rPr lang="en-US" dirty="0"/>
-                        <a:t>action[4]</a:t>
-                      </a:r>
-                    </a:p>
-                  </a:txBody>
-                  <a:tcPr/>
-                </a:tc>
-                <a:tc>
-                  <a:txBody>
-                    <a:bodyPr/>
-                    <a:lstStyle/>
-                    <a:p>
-                      <a:r>
-                        <a:rPr lang="en-US" dirty="0"/>
-                        <a:t>do nothing</a:t>
-                      </a:r>
-                    </a:p>
-                  </a:txBody>
-                  <a:tcPr/>
-                </a:tc>
-                <a:tc>
-                  <a:txBody>
-                    <a:bodyPr/>
-                    <a:lstStyle/>
-                    <a:p>
-                      <a:pPr marL="0" marR="0" lvl="0" indent="0" algn="l" defTabSz="914400" rtl="0" eaLnBrk="1" fontAlgn="auto" latinLnBrk="0" hangingPunct="1">
-                        <a:lnSpc>
-                          <a:spcPct val="100000"/>
-                        </a:lnSpc>
-                        <a:spcBef>
-                          <a:spcPts val="0"/>
-                        </a:spcBef>
-                        <a:spcAft>
-                          <a:spcPts val="0"/>
-                        </a:spcAft>
-                        <a:buClrTx/>
-                        <a:buSzTx/>
-                        <a:buFontTx/>
-                        <a:buNone/>
-                        <a:tabLst/>
-                        <a:defRPr/>
-                      </a:pPr>
-                      <a:r>
-                        <a:rPr lang="en-US" dirty="0"/>
-                        <a:t>N/A</a:t>
-                      </a:r>
-                    </a:p>
-                  </a:txBody>
-                  <a:tcPr/>
-                </a:tc>
-                <a:tc>
-                  <a:txBody>
-                    <a:bodyPr/>
-                    <a:lstStyle/>
-                    <a:p>
-                      <a:pPr marL="0" marR="0" lvl="0" indent="0" algn="l" defTabSz="914400" rtl="0" eaLnBrk="1" fontAlgn="auto" latinLnBrk="0" hangingPunct="1">
-                        <a:lnSpc>
-                          <a:spcPct val="100000"/>
-                        </a:lnSpc>
-                        <a:spcBef>
-                          <a:spcPts val="0"/>
-                        </a:spcBef>
-                        <a:spcAft>
-                          <a:spcPts val="0"/>
-                        </a:spcAft>
-                        <a:buClrTx/>
-                        <a:buSzTx/>
-                        <a:buFontTx/>
-                        <a:buNone/>
-                        <a:tabLst/>
-                        <a:defRPr/>
-                      </a:pPr>
-                      <a:r>
-                        <a:rPr lang="en-US" dirty="0"/>
-                        <a:t>N/A</a:t>
-                      </a:r>
-                    </a:p>
-                  </a:txBody>
-                  <a:tcPr/>
-                </a:tc>
-                <a:tc>
-                  <a:txBody>
-                    <a:bodyPr/>
-                    <a:lstStyle/>
-                    <a:p>
-                      <a:pPr marL="0" marR="0" lvl="0" indent="0" algn="l" defTabSz="914400" rtl="0" eaLnBrk="1" fontAlgn="auto" latinLnBrk="0" hangingPunct="1">
-                        <a:lnSpc>
-                          <a:spcPct val="100000"/>
-                        </a:lnSpc>
-                        <a:spcBef>
-                          <a:spcPts val="0"/>
-                        </a:spcBef>
-                        <a:spcAft>
-                          <a:spcPts val="0"/>
-                        </a:spcAft>
-                        <a:buClrTx/>
-                        <a:buSzTx/>
-                        <a:buFontTx/>
-                        <a:buNone/>
-                        <a:tabLst/>
-                        <a:defRPr/>
-                      </a:pPr>
-                      <a:endParaRPr lang="en-US" dirty="0"/>
-                    </a:p>
-                  </a:txBody>
-                  <a:tcPr/>
-                </a:tc>
-                <a:tc>
-                  <a:txBody>
-                    <a:bodyPr/>
-                    <a:lstStyle/>
-                    <a:p>
-                      <a:r>
-                        <a:rPr lang="en-US" dirty="0"/>
-                        <a:t>mouse y position</a:t>
-                      </a:r>
-                    </a:p>
-                  </a:txBody>
-                  <a:tcPr/>
-                </a:tc>
-                <a:extLst>
-                  <a:ext uri="{0D108BD9-81ED-4DB2-BD59-A6C34878D82A}">
-                    <a16:rowId xmlns:a16="http://schemas.microsoft.com/office/drawing/2014/main" val="2622650026"/>
-                  </a:ext>
-                </a:extLst>
-              </a:tr>
-            </a:tbl>
-          </a:graphicData>
-        </a:graphic>
-      </p:graphicFrame>
+              </p:cNvPr>
+              <p:cNvGraphicFramePr>
+                <a:graphicFrameLocks noGrp="1"/>
+              </p:cNvGraphicFramePr>
+              <p:nvPr>
+                <p:extLst>
+                  <p:ext uri="{D42A27DB-BD31-4B8C-83A1-F6EECF244321}">
+                    <p14:modId xmlns:p14="http://schemas.microsoft.com/office/powerpoint/2010/main" val="2493016741"/>
+                  </p:ext>
+                </p:extLst>
+              </p:nvPr>
+            </p:nvGraphicFramePr>
+            <p:xfrm>
+              <a:off x="1207362" y="1953868"/>
+              <a:ext cx="10146438" cy="1752600"/>
+            </p:xfrm>
+            <a:graphic>
+              <a:graphicData uri="http://schemas.openxmlformats.org/drawingml/2006/table">
+                <a:tbl>
+                  <a:tblPr firstRow="1" bandRow="1">
+                    <a:tableStyleId>{5C22544A-7EE6-4342-B048-85BDC9FD1C3A}</a:tableStyleId>
+                  </a:tblPr>
+                  <a:tblGrid>
+                    <a:gridCol w="1873189">
+                      <a:extLst>
+                        <a:ext uri="{9D8B030D-6E8A-4147-A177-3AD203B41FA5}">
+                          <a16:colId xmlns:a16="http://schemas.microsoft.com/office/drawing/2014/main" val="3852810974"/>
+                        </a:ext>
+                      </a:extLst>
+                    </a:gridCol>
+                    <a:gridCol w="1961966">
+                      <a:extLst>
+                        <a:ext uri="{9D8B030D-6E8A-4147-A177-3AD203B41FA5}">
+                          <a16:colId xmlns:a16="http://schemas.microsoft.com/office/drawing/2014/main" val="505222439"/>
+                        </a:ext>
+                      </a:extLst>
+                    </a:gridCol>
+                    <a:gridCol w="1642368">
+                      <a:extLst>
+                        <a:ext uri="{9D8B030D-6E8A-4147-A177-3AD203B41FA5}">
+                          <a16:colId xmlns:a16="http://schemas.microsoft.com/office/drawing/2014/main" val="1788938975"/>
+                        </a:ext>
+                      </a:extLst>
+                    </a:gridCol>
+                    <a:gridCol w="2272684">
+                      <a:extLst>
+                        <a:ext uri="{9D8B030D-6E8A-4147-A177-3AD203B41FA5}">
+                          <a16:colId xmlns:a16="http://schemas.microsoft.com/office/drawing/2014/main" val="1976107575"/>
+                        </a:ext>
+                      </a:extLst>
+                    </a:gridCol>
+                    <a:gridCol w="2396231">
+                      <a:extLst>
+                        <a:ext uri="{9D8B030D-6E8A-4147-A177-3AD203B41FA5}">
+                          <a16:colId xmlns:a16="http://schemas.microsoft.com/office/drawing/2014/main" val="1464474423"/>
+                        </a:ext>
+                      </a:extLst>
+                    </a:gridCol>
+                  </a:tblGrid>
+                  <a:tr h="370840">
+                    <a:tc>
+                      <a:txBody>
+                        <a:bodyPr/>
+                        <a:lstStyle/>
+                        <a:p>
+                          <a:endParaRPr lang="en-US" dirty="0"/>
+                        </a:p>
+                      </a:txBody>
+                      <a:tcPr/>
+                    </a:tc>
+                    <a:tc>
+                      <a:txBody>
+                        <a:bodyPr/>
+                        <a:lstStyle/>
+                        <a:p>
+                          <a:r>
+                            <a:rPr lang="en-US" dirty="0"/>
+                            <a:t>possible data</a:t>
+                          </a:r>
+                        </a:p>
+                      </a:txBody>
+                      <a:tcPr/>
+                    </a:tc>
+                    <a:tc>
+                      <a:txBody>
+                        <a:bodyPr/>
+                        <a:lstStyle/>
+                        <a:p>
+                          <a:endParaRPr lang="en-US" dirty="0"/>
+                        </a:p>
+                      </a:txBody>
+                      <a:tcPr/>
+                    </a:tc>
+                    <a:tc>
+                      <a:txBody>
+                        <a:bodyPr/>
+                        <a:lstStyle/>
+                        <a:p>
+                          <a:endParaRPr lang="en-US" dirty="0"/>
+                        </a:p>
+                      </a:txBody>
+                      <a:tcPr/>
+                    </a:tc>
+                    <a:tc>
+                      <a:txBody>
+                        <a:bodyPr/>
+                        <a:lstStyle/>
+                        <a:p>
+                          <a:endParaRPr lang="en-US" dirty="0"/>
+                        </a:p>
+                      </a:txBody>
+                      <a:tcPr/>
+                    </a:tc>
+                    <a:extLst>
+                      <a:ext uri="{0D108BD9-81ED-4DB2-BD59-A6C34878D82A}">
+                        <a16:rowId xmlns:a16="http://schemas.microsoft.com/office/drawing/2014/main" val="3682451536"/>
+                      </a:ext>
+                    </a:extLst>
+                  </a:tr>
+                  <a:tr h="640080">
+                    <a:tc>
+                      <a:txBody>
+                        <a:bodyPr/>
+                        <a:lstStyle/>
+                        <a:p>
+                          <a:endParaRPr lang="en-US"/>
+                        </a:p>
+                      </a:txBody>
+                      <a:tcPr>
+                        <a:blipFill>
+                          <a:blip r:embed="rId2"/>
+                          <a:stretch>
+                            <a:fillRect l="-326" t="-62264" r="-443648" b="-128302"/>
+                          </a:stretch>
+                        </a:blipFill>
+                      </a:tcPr>
+                    </a:tc>
+                    <a:tc>
+                      <a:txBody>
+                        <a:bodyPr/>
+                        <a:lstStyle/>
+                        <a:p>
+                          <a:endParaRPr lang="en-US"/>
+                        </a:p>
+                      </a:txBody>
+                      <a:tcPr>
+                        <a:blipFill>
+                          <a:blip r:embed="rId2"/>
+                          <a:stretch>
+                            <a:fillRect l="-95652" t="-62264" r="-322981" b="-128302"/>
+                          </a:stretch>
+                        </a:blipFill>
+                      </a:tcPr>
+                    </a:tc>
+                    <a:tc>
+                      <a:txBody>
+                        <a:bodyPr/>
+                        <a:lstStyle/>
+                        <a:p>
+                          <a:r>
+                            <a:rPr lang="en-US" dirty="0"/>
+                            <a:t>0: do nothing</a:t>
+                          </a:r>
+                        </a:p>
+                      </a:txBody>
+                      <a:tcPr/>
+                    </a:tc>
+                    <a:tc>
+                      <a:txBody>
+                        <a:bodyPr/>
+                        <a:lstStyle/>
+                        <a:p>
+                          <a:endParaRPr lang="en-US"/>
+                        </a:p>
+                      </a:txBody>
+                      <a:tcPr>
+                        <a:blipFill>
+                          <a:blip r:embed="rId2"/>
+                          <a:stretch>
+                            <a:fillRect l="-241287" t="-62264" r="-106434" b="-128302"/>
+                          </a:stretch>
+                        </a:blipFill>
+                      </a:tcPr>
+                    </a:tc>
+                    <a:tc>
+                      <a:txBody>
+                        <a:bodyPr/>
+                        <a:lstStyle/>
+                        <a:p>
+                          <a:endParaRPr lang="en-US" dirty="0"/>
+                        </a:p>
+                      </a:txBody>
+                      <a:tcPr/>
+                    </a:tc>
+                    <a:extLst>
+                      <a:ext uri="{0D108BD9-81ED-4DB2-BD59-A6C34878D82A}">
+                        <a16:rowId xmlns:a16="http://schemas.microsoft.com/office/drawing/2014/main" val="2045625300"/>
+                      </a:ext>
+                    </a:extLst>
+                  </a:tr>
+                  <a:tr h="370840">
+                    <a:tc>
+                      <a:txBody>
+                        <a:bodyPr/>
+                        <a:lstStyle/>
+                        <a:p>
+                          <a:r>
+                            <a:rPr lang="en-US" dirty="0"/>
+                            <a:t>action[1]</a:t>
+                          </a:r>
+                        </a:p>
+                      </a:txBody>
+                      <a:tcPr/>
+                    </a:tc>
+                    <a:tc>
+                      <a:txBody>
+                        <a:bodyPr/>
+                        <a:lstStyle/>
+                        <a:p>
+                          <a:r>
+                            <a:rPr lang="en-US" dirty="0"/>
+                            <a:t>-1: gripper release</a:t>
+                          </a:r>
+                        </a:p>
+                      </a:txBody>
+                      <a:tcPr/>
+                    </a:tc>
+                    <a:tc>
+                      <a:txBody>
+                        <a:bodyPr/>
+                        <a:lstStyle/>
+                        <a:p>
+                          <a:r>
+                            <a:rPr lang="en-US" dirty="0"/>
+                            <a:t>0: do nothing</a:t>
+                          </a:r>
+                        </a:p>
+                      </a:txBody>
+                      <a:tcPr/>
+                    </a:tc>
+                    <a:tc>
+                      <a:txBody>
+                        <a:bodyPr/>
+                        <a:lstStyle/>
+                        <a:p>
+                          <a:r>
+                            <a:rPr lang="en-US" dirty="0"/>
+                            <a:t>1: gripper grab</a:t>
+                          </a:r>
+                        </a:p>
+                      </a:txBody>
+                      <a:tcPr/>
+                    </a:tc>
+                    <a:tc>
+                      <a:txBody>
+                        <a:bodyPr/>
+                        <a:lstStyle/>
+                        <a:p>
+                          <a:r>
+                            <a:rPr lang="en-US" dirty="0"/>
+                            <a:t>2: extend sections</a:t>
+                          </a:r>
+                        </a:p>
+                      </a:txBody>
+                      <a:tcPr/>
+                    </a:tc>
+                    <a:extLst>
+                      <a:ext uri="{0D108BD9-81ED-4DB2-BD59-A6C34878D82A}">
+                        <a16:rowId xmlns:a16="http://schemas.microsoft.com/office/drawing/2014/main" val="2467114946"/>
+                      </a:ext>
+                    </a:extLst>
+                  </a:tr>
+                  <a:tr h="370840">
+                    <a:tc>
+                      <a:txBody>
+                        <a:bodyPr/>
+                        <a:lstStyle/>
+                        <a:p>
+                          <a:r>
+                            <a:rPr lang="en-US" dirty="0"/>
+                            <a:t>action[2]</a:t>
+                          </a:r>
+                        </a:p>
+                      </a:txBody>
+                      <a:tcPr/>
+                    </a:tc>
+                    <a:tc gridSpan="2">
+                      <a:txBody>
+                        <a:bodyPr/>
+                        <a:lstStyle/>
+                        <a:p>
+                          <a:r>
+                            <a:rPr lang="en-US" dirty="0"/>
+                            <a:t>[list]: position [x, y] of way points</a:t>
+                          </a:r>
+                        </a:p>
+                      </a:txBody>
+                      <a:tcPr/>
+                    </a:tc>
+                    <a:tc hMerge="1">
+                      <a:txBody>
+                        <a:bodyPr/>
+                        <a:lstStyle/>
+                        <a:p>
+                          <a:endParaRPr lang="en-US" dirty="0"/>
+                        </a:p>
+                      </a:txBody>
+                      <a:tcPr/>
+                    </a:tc>
+                    <a:tc>
+                      <a:txBody>
+                        <a:bodyPr/>
+                        <a:lstStyle/>
+                        <a:p>
+                          <a:r>
+                            <a:rPr lang="en-US" dirty="0"/>
+                            <a:t>-1: clear up waypoints</a:t>
+                          </a:r>
+                        </a:p>
+                      </a:txBody>
+                      <a:tcPr/>
+                    </a:tc>
+                    <a:tc>
+                      <a:txBody>
+                        <a:bodyPr/>
+                        <a:lstStyle/>
+                        <a:p>
+                          <a:r>
+                            <a:rPr lang="en-US" dirty="0"/>
+                            <a:t>0 or others: do nothing</a:t>
+                          </a:r>
+                        </a:p>
+                      </a:txBody>
+                      <a:tcPr/>
+                    </a:tc>
+                    <a:extLst>
+                      <a:ext uri="{0D108BD9-81ED-4DB2-BD59-A6C34878D82A}">
+                        <a16:rowId xmlns:a16="http://schemas.microsoft.com/office/drawing/2014/main" val="1273251932"/>
+                      </a:ext>
+                    </a:extLst>
+                  </a:tr>
+                </a:tbl>
+              </a:graphicData>
+            </a:graphic>
+          </p:graphicFrame>
+        </mc:Fallback>
+      </mc:AlternateContent>
     </p:spTree>
     <p:extLst>
       <p:ext uri="{BB962C8B-B14F-4D97-AF65-F5344CB8AC3E}">

</xml_diff>